<commit_message>
update presentation planning, please check your parts
</commit_message>
<xml_diff>
--- a/Docs/Reports/Planning Presentation/V2Planning.pptx
+++ b/Docs/Reports/Planning Presentation/V2Planning.pptx
@@ -5,7 +5,7 @@
     <p:sldMasterId id="2147483690" r:id="rId1"/>
   </p:sldMasterIdLst>
   <p:notesMasterIdLst>
-    <p:notesMasterId r:id="rId14"/>
+    <p:notesMasterId r:id="rId13"/>
   </p:notesMasterIdLst>
   <p:sldIdLst>
     <p:sldId id="256" r:id="rId2"/>
@@ -16,10 +16,9 @@
     <p:sldId id="272" r:id="rId7"/>
     <p:sldId id="259" r:id="rId8"/>
     <p:sldId id="262" r:id="rId9"/>
-    <p:sldId id="265" r:id="rId10"/>
-    <p:sldId id="263" r:id="rId11"/>
-    <p:sldId id="260" r:id="rId12"/>
-    <p:sldId id="261" r:id="rId13"/>
+    <p:sldId id="263" r:id="rId10"/>
+    <p:sldId id="260" r:id="rId11"/>
+    <p:sldId id="261" r:id="rId12"/>
   </p:sldIdLst>
   <p:sldSz cx="12192000" cy="6858000"/>
   <p:notesSz cx="6858000" cy="9144000"/>
@@ -120,7 +119,7 @@
   </p:defaultTextStyle>
   <p:extLst>
     <p:ext uri="{EFAFB233-063F-42B5-8137-9DF3F51BA10A}">
-      <p15:sldGuideLst xmlns:p15="http://schemas.microsoft.com/office/powerpoint/2012/main" xmlns=""/>
+      <p15:sldGuideLst xmlns="" xmlns:p15="http://schemas.microsoft.com/office/powerpoint/2012/main"/>
     </p:ext>
   </p:extLst>
 </p:presentation>
@@ -633,90 +632,6 @@
     </p:spTree>
     <p:extLst>
       <p:ext uri="{BB962C8B-B14F-4D97-AF65-F5344CB8AC3E}">
-        <p14:creationId xmlns:p14="http://schemas.microsoft.com/office/powerpoint/2010/main" val="3748168410"/>
-      </p:ext>
-    </p:extLst>
-  </p:cSld>
-  <p:clrMapOvr>
-    <a:masterClrMapping/>
-  </p:clrMapOvr>
-</p:notes>
-</file>
-
-<file path=ppt/notesSlides/notesSlide11.xml><?xml version="1.0" encoding="utf-8"?>
-<p:notes xmlns:a="http://schemas.openxmlformats.org/drawingml/2006/main" xmlns:r="http://schemas.openxmlformats.org/officeDocument/2006/relationships" xmlns:p="http://schemas.openxmlformats.org/presentationml/2006/main">
-  <p:cSld>
-    <p:spTree>
-      <p:nvGrpSpPr>
-        <p:cNvPr id="1" name=""/>
-        <p:cNvGrpSpPr/>
-        <p:nvPr/>
-      </p:nvGrpSpPr>
-      <p:grpSpPr>
-        <a:xfrm>
-          <a:off x="0" y="0"/>
-          <a:ext cx="0" cy="0"/>
-          <a:chOff x="0" y="0"/>
-          <a:chExt cx="0" cy="0"/>
-        </a:xfrm>
-      </p:grpSpPr>
-      <p:sp>
-        <p:nvSpPr>
-          <p:cNvPr id="2" name="Espace réservé de l'image des diapositives 1"/>
-          <p:cNvSpPr>
-            <a:spLocks noGrp="1" noRot="1" noChangeAspect="1"/>
-          </p:cNvSpPr>
-          <p:nvPr>
-            <p:ph type="sldImg"/>
-          </p:nvPr>
-        </p:nvSpPr>
-        <p:spPr/>
-      </p:sp>
-      <p:sp>
-        <p:nvSpPr>
-          <p:cNvPr id="3" name="Espace réservé des notes 2"/>
-          <p:cNvSpPr>
-            <a:spLocks noGrp="1"/>
-          </p:cNvSpPr>
-          <p:nvPr>
-            <p:ph type="body" idx="1"/>
-          </p:nvPr>
-        </p:nvSpPr>
-        <p:spPr/>
-        <p:txBody>
-          <a:bodyPr/>
-          <a:lstStyle/>
-          <a:p>
-            <a:endParaRPr lang="fr-FR"/>
-          </a:p>
-        </p:txBody>
-      </p:sp>
-      <p:sp>
-        <p:nvSpPr>
-          <p:cNvPr id="4" name="Espace réservé du numéro de diapositive 3"/>
-          <p:cNvSpPr>
-            <a:spLocks noGrp="1"/>
-          </p:cNvSpPr>
-          <p:nvPr>
-            <p:ph type="sldNum" sz="quarter" idx="10"/>
-          </p:nvPr>
-        </p:nvSpPr>
-        <p:spPr/>
-        <p:txBody>
-          <a:bodyPr/>
-          <a:lstStyle/>
-          <a:p>
-            <a:fld id="{F5AE91CA-69E1-4F73-A570-C18A4465CE0F}" type="slidenum">
-              <a:rPr lang="fr-FR"/>
-              <a:t>12</a:t>
-            </a:fld>
-            <a:endParaRPr lang="fr-FR"/>
-          </a:p>
-        </p:txBody>
-      </p:sp>
-    </p:spTree>
-    <p:extLst>
-      <p:ext uri="{BB962C8B-B14F-4D97-AF65-F5344CB8AC3E}">
         <p14:creationId xmlns:p14="http://schemas.microsoft.com/office/powerpoint/2010/main" val="4056118811"/>
       </p:ext>
     </p:extLst>
@@ -1305,7 +1220,7 @@
     </p:spTree>
     <p:extLst>
       <p:ext uri="{BB962C8B-B14F-4D97-AF65-F5344CB8AC3E}">
-        <p14:creationId xmlns:p14="http://schemas.microsoft.com/office/powerpoint/2010/main" val="3115056537"/>
+        <p14:creationId xmlns:p14="http://schemas.microsoft.com/office/powerpoint/2010/main" val="984219930"/>
       </p:ext>
     </p:extLst>
   </p:cSld>
@@ -1389,7 +1304,7 @@
     </p:spTree>
     <p:extLst>
       <p:ext uri="{BB962C8B-B14F-4D97-AF65-F5344CB8AC3E}">
-        <p14:creationId xmlns:p14="http://schemas.microsoft.com/office/powerpoint/2010/main" val="984219930"/>
+        <p14:creationId xmlns:p14="http://schemas.microsoft.com/office/powerpoint/2010/main" val="3748168410"/>
       </p:ext>
     </p:extLst>
   </p:cSld>
@@ -2038,13 +1953,21 @@
         </p:spPr>
         <p:txBody>
           <a:bodyPr/>
-          <a:lstStyle/>
-          <a:p>
-            <a:r>
-              <a:rPr lang="en-US" smtClean="0"/>
+          <a:lstStyle>
+            <a:lvl1pPr>
+              <a:defRPr>
+                <a:solidFill>
+                  <a:srgbClr val="FF3300"/>
+                </a:solidFill>
+              </a:defRPr>
+            </a:lvl1pPr>
+          </a:lstStyle>
+          <a:p>
+            <a:r>
+              <a:rPr lang="en-US" dirty="0" smtClean="0"/>
               <a:t>Click to edit Master title style</a:t>
             </a:r>
-            <a:endParaRPr lang="en-US"/>
+            <a:endParaRPr lang="en-US" dirty="0"/>
           </a:p>
         </p:txBody>
       </p:sp>
@@ -5169,90 +5092,102 @@
           <a:lstStyle/>
           <a:p>
             <a:r>
-              <a:rPr lang="fr-FR" dirty="0"/>
-              <a:t>Important dates</a:t>
+              <a:rPr lang="fr-FR" b="1" dirty="0" smtClean="0"/>
+              <a:t>5. </a:t>
+            </a:r>
+            <a:r>
+              <a:rPr lang="fr-FR" b="1" dirty="0" err="1" smtClean="0"/>
+              <a:t>Tasks</a:t>
+            </a:r>
+            <a:r>
+              <a:rPr lang="fr-FR" b="1" dirty="0" smtClean="0"/>
+              <a:t> </a:t>
+            </a:r>
+            <a:r>
+              <a:rPr lang="fr-FR" b="1" dirty="0"/>
+              <a:t>planning</a:t>
+            </a:r>
+          </a:p>
+        </p:txBody>
+      </p:sp>
+      <p:sp>
+        <p:nvSpPr>
+          <p:cNvPr id="3" name="Slide Number Placeholder 2"/>
+          <p:cNvSpPr>
+            <a:spLocks noGrp="1"/>
+          </p:cNvSpPr>
+          <p:nvPr>
+            <p:ph type="sldNum" sz="quarter" idx="12"/>
+          </p:nvPr>
+        </p:nvSpPr>
+        <p:spPr/>
+        <p:txBody>
+          <a:bodyPr/>
+          <a:lstStyle/>
+          <a:p>
+            <a:fld id="{27C6CCC6-2BE5-4E42-96A4-D1E8E81A3D8E}" type="slidenum">
+              <a:rPr lang="de-DE" smtClean="0"/>
+              <a:t>10</a:t>
+            </a:fld>
+            <a:endParaRPr lang="de-DE"/>
+          </a:p>
+        </p:txBody>
+      </p:sp>
+      <p:sp>
+        <p:nvSpPr>
+          <p:cNvPr id="8" name="Rectangle 7"/>
+          <p:cNvSpPr/>
+          <p:nvPr/>
+        </p:nvSpPr>
+        <p:spPr>
+          <a:xfrm>
+            <a:off x="5971607" y="3244334"/>
+            <a:ext cx="248786" cy="369332"/>
+          </a:xfrm>
+          <a:prstGeom prst="rect">
+            <a:avLst/>
+          </a:prstGeom>
+        </p:spPr>
+        <p:txBody>
+          <a:bodyPr wrap="none">
+            <a:spAutoFit/>
+          </a:bodyPr>
+          <a:lstStyle/>
+          <a:p>
+            <a:r>
+              <a:rPr lang="en-US" dirty="0"/>
+              <a:t> </a:t>
             </a:r>
           </a:p>
         </p:txBody>
       </p:sp>
       <p:pic>
         <p:nvPicPr>
-          <p:cNvPr id="3" name="Espace réservé du contenu 2" descr="DatesChronology.png"/>
+          <p:cNvPr id="9" name="Espace réservé du contenu 3"/>
           <p:cNvPicPr>
             <a:picLocks noGrp="1" noChangeAspect="1"/>
           </p:cNvPicPr>
-          <p:nvPr>
-            <p:ph idx="1"/>
-          </p:nvPr>
+          <p:nvPr/>
         </p:nvPicPr>
         <p:blipFill rotWithShape="1">
-          <a:blip r:embed="rId3">
-            <a:extLst>
-              <a:ext uri="{28A0092B-C50C-407E-A947-70E740481C1C}">
-                <a14:useLocalDpi xmlns:a14="http://schemas.microsoft.com/office/drawing/2010/main" val="0"/>
-              </a:ext>
-            </a:extLst>
-          </a:blip>
-          <a:srcRect l="5711" t="17201" r="46346" b="19708"/>
+          <a:blip r:embed="rId3"/>
+          <a:srcRect r="9520"/>
           <a:stretch/>
         </p:blipFill>
         <p:spPr>
           <a:xfrm>
-            <a:off x="2088000" y="1692000"/>
-            <a:ext cx="10044000" cy="1728000"/>
-          </a:xfrm>
-        </p:spPr>
-      </p:pic>
-      <p:pic>
-        <p:nvPicPr>
-          <p:cNvPr id="5" name="Espace réservé du contenu 2" descr="DatesChronology.png"/>
-          <p:cNvPicPr>
-            <a:picLocks noChangeAspect="1"/>
-          </p:cNvPicPr>
-          <p:nvPr/>
-        </p:nvPicPr>
-        <p:blipFill rotWithShape="1">
-          <a:blip r:embed="rId4"/>
-          <a:srcRect l="48384" r="-1321"/>
-          <a:stretch/>
-        </p:blipFill>
-        <p:spPr>
-          <a:xfrm>
-            <a:off x="36000" y="3667135"/>
-            <a:ext cx="11088000" cy="2741755"/>
+            <a:off x="155225" y="1684230"/>
+            <a:ext cx="11881550" cy="4370690"/>
           </a:xfrm>
           <a:prstGeom prst="rect">
             <a:avLst/>
           </a:prstGeom>
         </p:spPr>
       </p:pic>
-      <p:sp>
-        <p:nvSpPr>
-          <p:cNvPr id="4" name="Slide Number Placeholder 3"/>
-          <p:cNvSpPr>
-            <a:spLocks noGrp="1"/>
-          </p:cNvSpPr>
-          <p:nvPr>
-            <p:ph type="sldNum" sz="quarter" idx="12"/>
-          </p:nvPr>
-        </p:nvSpPr>
-        <p:spPr/>
-        <p:txBody>
-          <a:bodyPr/>
-          <a:lstStyle/>
-          <a:p>
-            <a:fld id="{27C6CCC6-2BE5-4E42-96A4-D1E8E81A3D8E}" type="slidenum">
-              <a:rPr lang="de-DE" smtClean="0"/>
-              <a:t>10</a:t>
-            </a:fld>
-            <a:endParaRPr lang="de-DE"/>
-          </a:p>
-        </p:txBody>
-      </p:sp>
     </p:spTree>
     <p:extLst>
       <p:ext uri="{BB962C8B-B14F-4D97-AF65-F5344CB8AC3E}">
-        <p14:creationId xmlns:p14="http://schemas.microsoft.com/office/powerpoint/2010/main" val="2704138539"/>
+        <p14:creationId xmlns:p14="http://schemas.microsoft.com/office/powerpoint/2010/main" val="2380993638"/>
       </p:ext>
     </p:extLst>
   </p:cSld>
@@ -5306,36 +5241,183 @@
           <a:p>
             <a:r>
               <a:rPr lang="fr-FR"/>
-              <a:t>Tasks planning</a:t>
-            </a:r>
-          </a:p>
-        </p:txBody>
-      </p:sp>
-      <p:pic>
-        <p:nvPicPr>
-          <p:cNvPr id="5" name="Espace réservé du contenu 4"/>
-          <p:cNvPicPr>
-            <a:picLocks noGrp="1" noChangeAspect="1"/>
-          </p:cNvPicPr>
+              <a:t>Conclusion</a:t>
+            </a:r>
+          </a:p>
+        </p:txBody>
+      </p:sp>
+      <p:sp>
+        <p:nvSpPr>
+          <p:cNvPr id="3" name="Espace réservé du contenu 2"/>
+          <p:cNvSpPr>
+            <a:spLocks noGrp="1"/>
+          </p:cNvSpPr>
           <p:nvPr>
             <p:ph idx="1"/>
           </p:nvPr>
-        </p:nvPicPr>
-        <p:blipFill rotWithShape="1">
-          <a:blip r:embed="rId3"/>
-          <a:srcRect l="774" r="11916"/>
-          <a:stretch/>
-        </p:blipFill>
-        <p:spPr>
-          <a:xfrm>
-            <a:off x="107999" y="2632545"/>
-            <a:ext cx="11802037" cy="2679288"/>
-          </a:xfrm>
-        </p:spPr>
-      </p:pic>
-      <p:sp>
-        <p:nvSpPr>
-          <p:cNvPr id="3" name="Slide Number Placeholder 2"/>
+        </p:nvSpPr>
+        <p:spPr/>
+        <p:txBody>
+          <a:bodyPr>
+            <a:normAutofit/>
+          </a:bodyPr>
+          <a:lstStyle/>
+          <a:p>
+            <a:r>
+              <a:rPr lang="fr-FR" sz="2400" dirty="0"/>
+              <a:t>Agile </a:t>
+            </a:r>
+            <a:r>
+              <a:rPr lang="fr-FR" sz="2400" dirty="0" err="1"/>
+              <a:t>methodology</a:t>
+            </a:r>
+            <a:r>
+              <a:rPr lang="fr-FR" sz="2400" dirty="0"/>
+              <a:t> </a:t>
+            </a:r>
+            <a:r>
+              <a:rPr lang="fr-FR" sz="2400" dirty="0" err="1"/>
+              <a:t>along</a:t>
+            </a:r>
+            <a:r>
+              <a:rPr lang="fr-FR" sz="2400" dirty="0"/>
+              <a:t> </a:t>
+            </a:r>
+            <a:r>
+              <a:rPr lang="fr-FR" sz="2400" dirty="0" err="1"/>
+              <a:t>our</a:t>
+            </a:r>
+            <a:r>
+              <a:rPr lang="fr-FR" sz="2400" dirty="0"/>
+              <a:t> </a:t>
+            </a:r>
+            <a:r>
+              <a:rPr lang="fr-FR" sz="2400" dirty="0" err="1"/>
+              <a:t>project</a:t>
+            </a:r>
+            <a:endParaRPr lang="fr-FR" sz="2400" dirty="0"/>
+          </a:p>
+          <a:p>
+            <a:r>
+              <a:rPr lang="fr-FR" sz="2400" dirty="0"/>
+              <a:t>Poker </a:t>
+            </a:r>
+            <a:r>
+              <a:rPr lang="fr-FR" sz="2400" dirty="0" err="1"/>
+              <a:t>method</a:t>
+            </a:r>
+            <a:r>
+              <a:rPr lang="fr-FR" sz="2400" dirty="0"/>
+              <a:t> to </a:t>
+            </a:r>
+            <a:r>
+              <a:rPr lang="en-US" sz="2400" dirty="0"/>
+              <a:t>get a better estimation of the </a:t>
+            </a:r>
+            <a:r>
+              <a:rPr lang="fr-FR" sz="2400" dirty="0" err="1"/>
+              <a:t>workload</a:t>
+            </a:r>
+            <a:endParaRPr lang="fr-FR" sz="2400" dirty="0"/>
+          </a:p>
+          <a:p>
+            <a:r>
+              <a:rPr lang="fr-FR" sz="2400" dirty="0" err="1"/>
+              <a:t>Analysis</a:t>
+            </a:r>
+            <a:r>
+              <a:rPr lang="fr-FR" sz="2400" dirty="0"/>
+              <a:t> of </a:t>
+            </a:r>
+            <a:r>
+              <a:rPr lang="fr-FR" sz="2400" dirty="0" err="1"/>
+              <a:t>Environment</a:t>
+            </a:r>
+            <a:endParaRPr lang="fr-FR" sz="2400" dirty="0"/>
+          </a:p>
+          <a:p>
+            <a:pPr lvl="1">
+              <a:buFont typeface="Arial" panose="020B0604020202020204" pitchFamily="34" charset="0"/>
+              <a:buChar char="•"/>
+            </a:pPr>
+            <a:r>
+              <a:rPr lang="fr-FR" sz="2000" dirty="0" err="1"/>
+              <a:t>Internal</a:t>
+            </a:r>
+            <a:r>
+              <a:rPr lang="fr-FR" sz="2000" dirty="0"/>
+              <a:t> and </a:t>
+            </a:r>
+            <a:r>
+              <a:rPr lang="fr-FR" sz="2000" dirty="0" err="1"/>
+              <a:t>external</a:t>
+            </a:r>
+            <a:r>
+              <a:rPr lang="fr-FR" sz="2000" dirty="0"/>
+              <a:t> </a:t>
+            </a:r>
+            <a:r>
+              <a:rPr lang="fr-FR" sz="2000" dirty="0" err="1"/>
+              <a:t>resources</a:t>
+            </a:r>
+            <a:endParaRPr lang="fr-FR" sz="2000" dirty="0"/>
+          </a:p>
+          <a:p>
+            <a:pPr lvl="1">
+              <a:buFont typeface="Arial" panose="020B0604020202020204" pitchFamily="34" charset="0"/>
+              <a:buChar char="•"/>
+            </a:pPr>
+            <a:r>
+              <a:rPr lang="fr-FR" sz="2000" dirty="0"/>
+              <a:t>Dates</a:t>
+            </a:r>
+          </a:p>
+          <a:p>
+            <a:pPr lvl="1">
+              <a:buFont typeface="Arial" panose="020B0604020202020204" pitchFamily="34" charset="0"/>
+              <a:buChar char="•"/>
+            </a:pPr>
+            <a:r>
+              <a:rPr lang="fr-FR" sz="2000" dirty="0" err="1"/>
+              <a:t>Risks</a:t>
+            </a:r>
+            <a:endParaRPr lang="fr-FR" sz="2000" dirty="0"/>
+          </a:p>
+          <a:p>
+            <a:r>
+              <a:rPr lang="fr-FR" sz="2400" dirty="0"/>
+              <a:t>Schedule </a:t>
+            </a:r>
+            <a:r>
+              <a:rPr lang="fr-FR" sz="2400" dirty="0" err="1"/>
+              <a:t>based</a:t>
+            </a:r>
+            <a:r>
+              <a:rPr lang="fr-FR" sz="2400" dirty="0"/>
+              <a:t> on the </a:t>
+            </a:r>
+            <a:r>
+              <a:rPr lang="fr-FR" sz="2400" dirty="0" err="1"/>
+              <a:t>aforementioned</a:t>
+            </a:r>
+            <a:r>
+              <a:rPr lang="fr-FR" sz="2400" dirty="0"/>
+              <a:t> </a:t>
+            </a:r>
+            <a:r>
+              <a:rPr lang="fr-FR" sz="2400" dirty="0" err="1"/>
+              <a:t>results</a:t>
+            </a:r>
+            <a:endParaRPr lang="fr-FR" sz="2400" dirty="0"/>
+          </a:p>
+          <a:p>
+            <a:endParaRPr lang="fr-FR" sz="2400" i="1" u="sng" dirty="0"/>
+          </a:p>
+        </p:txBody>
+      </p:sp>
+      <p:sp>
+        <p:nvSpPr>
+          <p:cNvPr id="4" name="Slide Number Placeholder 3"/>
           <p:cNvSpPr>
             <a:spLocks noGrp="1"/>
           </p:cNvSpPr>
@@ -5351,163 +5433,6 @@
             <a:fld id="{27C6CCC6-2BE5-4E42-96A4-D1E8E81A3D8E}" type="slidenum">
               <a:rPr lang="de-DE" smtClean="0"/>
               <a:t>11</a:t>
-            </a:fld>
-            <a:endParaRPr lang="de-DE"/>
-          </a:p>
-        </p:txBody>
-      </p:sp>
-    </p:spTree>
-    <p:extLst>
-      <p:ext uri="{BB962C8B-B14F-4D97-AF65-F5344CB8AC3E}">
-        <p14:creationId xmlns:p14="http://schemas.microsoft.com/office/powerpoint/2010/main" val="2380993638"/>
-      </p:ext>
-    </p:extLst>
-  </p:cSld>
-  <p:clrMapOvr>
-    <a:masterClrMapping/>
-  </p:clrMapOvr>
-  <p:transition spd="slow">
-    <p:push dir="u"/>
-  </p:transition>
-  <p:timing>
-    <p:tnLst>
-      <p:par>
-        <p:cTn id="1" dur="indefinite" restart="never" nodeType="tmRoot"/>
-      </p:par>
-    </p:tnLst>
-  </p:timing>
-</p:sld>
-</file>
-
-<file path=ppt/slides/slide12.xml><?xml version="1.0" encoding="utf-8"?>
-<p:sld xmlns:a="http://schemas.openxmlformats.org/drawingml/2006/main" xmlns:r="http://schemas.openxmlformats.org/officeDocument/2006/relationships" xmlns:p="http://schemas.openxmlformats.org/presentationml/2006/main">
-  <p:cSld>
-    <p:spTree>
-      <p:nvGrpSpPr>
-        <p:cNvPr id="1" name=""/>
-        <p:cNvGrpSpPr/>
-        <p:nvPr/>
-      </p:nvGrpSpPr>
-      <p:grpSpPr>
-        <a:xfrm>
-          <a:off x="0" y="0"/>
-          <a:ext cx="0" cy="0"/>
-          <a:chOff x="0" y="0"/>
-          <a:chExt cx="0" cy="0"/>
-        </a:xfrm>
-      </p:grpSpPr>
-      <p:sp>
-        <p:nvSpPr>
-          <p:cNvPr id="2" name="Titre 1"/>
-          <p:cNvSpPr>
-            <a:spLocks noGrp="1"/>
-          </p:cNvSpPr>
-          <p:nvPr>
-            <p:ph type="title"/>
-          </p:nvPr>
-        </p:nvSpPr>
-        <p:spPr/>
-        <p:txBody>
-          <a:bodyPr/>
-          <a:lstStyle/>
-          <a:p>
-            <a:r>
-              <a:rPr lang="fr-FR"/>
-              <a:t>Conclusion</a:t>
-            </a:r>
-          </a:p>
-        </p:txBody>
-      </p:sp>
-      <p:sp>
-        <p:nvSpPr>
-          <p:cNvPr id="3" name="Espace réservé du contenu 2"/>
-          <p:cNvSpPr>
-            <a:spLocks noGrp="1"/>
-          </p:cNvSpPr>
-          <p:nvPr>
-            <p:ph idx="1"/>
-          </p:nvPr>
-        </p:nvSpPr>
-        <p:spPr/>
-        <p:txBody>
-          <a:bodyPr/>
-          <a:lstStyle/>
-          <a:p>
-            <a:r>
-              <a:rPr lang="fr-FR"/>
-              <a:t>Agile methodology along our project</a:t>
-            </a:r>
-          </a:p>
-          <a:p>
-            <a:r>
-              <a:rPr lang="fr-FR"/>
-              <a:t>Poker method to </a:t>
-            </a:r>
-            <a:r>
-              <a:rPr lang="en-US"/>
-              <a:t>get a better estimation of the </a:t>
-            </a:r>
-            <a:r>
-              <a:rPr lang="fr-FR"/>
-              <a:t>workload</a:t>
-            </a:r>
-          </a:p>
-          <a:p>
-            <a:r>
-              <a:rPr lang="fr-FR"/>
-              <a:t>Analysis of Environment</a:t>
-            </a:r>
-          </a:p>
-          <a:p>
-            <a:pPr lvl="1"/>
-            <a:r>
-              <a:rPr lang="fr-FR"/>
-              <a:t>Internal and external resources</a:t>
-            </a:r>
-          </a:p>
-          <a:p>
-            <a:pPr lvl="1"/>
-            <a:r>
-              <a:rPr lang="fr-FR"/>
-              <a:t>Dates</a:t>
-            </a:r>
-          </a:p>
-          <a:p>
-            <a:pPr lvl="1"/>
-            <a:r>
-              <a:rPr lang="fr-FR"/>
-              <a:t>Risks</a:t>
-            </a:r>
-          </a:p>
-          <a:p>
-            <a:r>
-              <a:rPr lang="fr-FR"/>
-              <a:t>Schedule based on the aforementioned results</a:t>
-            </a:r>
-          </a:p>
-          <a:p>
-            <a:endParaRPr lang="fr-FR" i="1" u="sng"/>
-          </a:p>
-        </p:txBody>
-      </p:sp>
-      <p:sp>
-        <p:nvSpPr>
-          <p:cNvPr id="4" name="Slide Number Placeholder 3"/>
-          <p:cNvSpPr>
-            <a:spLocks noGrp="1"/>
-          </p:cNvSpPr>
-          <p:nvPr>
-            <p:ph type="sldNum" sz="quarter" idx="12"/>
-          </p:nvPr>
-        </p:nvSpPr>
-        <p:spPr/>
-        <p:txBody>
-          <a:bodyPr/>
-          <a:lstStyle/>
-          <a:p>
-            <a:fld id="{27C6CCC6-2BE5-4E42-96A4-D1E8E81A3D8E}" type="slidenum">
-              <a:rPr lang="de-DE" smtClean="0"/>
-              <a:t>12</a:t>
             </a:fld>
             <a:endParaRPr lang="de-DE"/>
           </a:p>
@@ -5553,240 +5478,49 @@
           <a:chExt cx="0" cy="0"/>
         </a:xfrm>
       </p:grpSpPr>
-      <p:sp>
-        <p:nvSpPr>
-          <p:cNvPr id="2" name="Titre 1"/>
-          <p:cNvSpPr>
-            <a:spLocks noGrp="1"/>
-          </p:cNvSpPr>
-          <p:nvPr>
-            <p:ph type="title"/>
-          </p:nvPr>
-        </p:nvSpPr>
-        <p:spPr/>
-        <p:txBody>
-          <a:bodyPr/>
-          <a:lstStyle/>
-          <a:p>
-            <a:r>
-              <a:rPr lang="fr-FR" dirty="0"/>
-              <a:t>Introduction</a:t>
-            </a:r>
-          </a:p>
-        </p:txBody>
-      </p:sp>
-      <p:sp>
-        <p:nvSpPr>
-          <p:cNvPr id="4" name="ZoneTexte 3"/>
-          <p:cNvSpPr txBox="1"/>
+      <p:pic>
+        <p:nvPicPr>
+          <p:cNvPr id="12" name="Image 3" descr="Arimaa.jpg"/>
+          <p:cNvPicPr>
+            <a:picLocks noChangeAspect="1"/>
+          </p:cNvPicPr>
           <p:nvPr/>
-        </p:nvSpPr>
+        </p:nvPicPr>
+        <p:blipFill>
+          <a:blip r:embed="rId3"/>
+          <a:stretch>
+            <a:fillRect/>
+          </a:stretch>
+        </p:blipFill>
         <p:spPr>
           <a:xfrm>
-            <a:off x="1814189" y="2652506"/>
-            <a:ext cx="2743200" cy="769441"/>
-          </a:xfrm>
-          <a:prstGeom prst="rect">
-            <a:avLst/>
-          </a:prstGeom>
-          <a:noFill/>
-        </p:spPr>
-        <p:style>
-          <a:lnRef idx="2">
-            <a:schemeClr val="accent5"/>
-          </a:lnRef>
-          <a:fillRef idx="1">
-            <a:schemeClr val="lt1"/>
-          </a:fillRef>
-          <a:effectRef idx="0">
-            <a:schemeClr val="accent5"/>
-          </a:effectRef>
-          <a:fontRef idx="minor">
-            <a:schemeClr val="dk1"/>
-          </a:fontRef>
-        </p:style>
-        <p:txBody>
-          <a:bodyPr rtlCol="0">
-            <a:spAutoFit/>
-          </a:bodyPr>
-          <a:lstStyle/>
-          <a:p>
-            <a:pPr algn="ctr"/>
-            <a:r>
-              <a:rPr lang="fr-FR" sz="4400" i="1" dirty="0">
-                <a:latin typeface="Comic Sans MS"/>
-              </a:rPr>
-              <a:t>ARIMAA</a:t>
-            </a:r>
-          </a:p>
-        </p:txBody>
-      </p:sp>
-      <p:sp>
-        <p:nvSpPr>
-          <p:cNvPr id="6" name="ZoneTexte 5"/>
-          <p:cNvSpPr txBox="1"/>
-          <p:nvPr/>
-        </p:nvSpPr>
-        <p:spPr>
-          <a:xfrm>
-            <a:off x="5272976" y="2504941"/>
-            <a:ext cx="5876199" cy="1231106"/>
+            <a:off x="6460434" y="1794733"/>
+            <a:ext cx="4638788" cy="4013543"/>
           </a:xfrm>
           <a:prstGeom prst="rect">
             <a:avLst/>
           </a:prstGeom>
         </p:spPr>
-        <p:txBody>
-          <a:bodyPr rtlCol="0">
-            <a:spAutoFit/>
-          </a:bodyPr>
+      </p:pic>
+      <p:sp>
+        <p:nvSpPr>
+          <p:cNvPr id="2" name="Titre 1"/>
+          <p:cNvSpPr>
+            <a:spLocks noGrp="1"/>
+          </p:cNvSpPr>
+          <p:nvPr>
+            <p:ph type="title"/>
+          </p:nvPr>
+        </p:nvSpPr>
+        <p:spPr/>
+        <p:txBody>
+          <a:bodyPr/>
           <a:lstStyle/>
           <a:p>
-            <a:pPr marL="285750" indent="-285750">
-              <a:buFont typeface="Arial" panose="020B0604020202020204" pitchFamily="34" charset="0"/>
-              <a:buChar char="•"/>
-            </a:pPr>
-            <a:r>
-              <a:rPr lang="en-US" sz="2800"/>
-              <a:t>Game not solved</a:t>
-            </a:r>
-          </a:p>
-          <a:p>
-            <a:pPr marL="285750" indent="-285750">
-              <a:buFont typeface="Arial" panose="020B0604020202020204" pitchFamily="34" charset="0"/>
-              <a:buChar char="•"/>
-            </a:pPr>
-            <a:endParaRPr lang="en-US"/>
-          </a:p>
-          <a:p>
-            <a:pPr marL="285750" indent="-285750">
-              <a:buFont typeface="Arial" panose="020B0604020202020204" pitchFamily="34" charset="0"/>
-              <a:buChar char="•"/>
-            </a:pPr>
-            <a:r>
-              <a:rPr lang="en-US" sz="2800"/>
-              <a:t>Made to be difficult for computers</a:t>
-            </a:r>
-            <a:endParaRPr lang="fr-FR" sz="2800">
-              <a:solidFill>
-                <a:srgbClr val="000000"/>
-              </a:solidFill>
-              <a:latin typeface="Calibri"/>
-            </a:endParaRPr>
-          </a:p>
-        </p:txBody>
-      </p:sp>
-      <p:sp>
-        <p:nvSpPr>
-          <p:cNvPr id="8" name="ZoneTexte 7"/>
-          <p:cNvSpPr txBox="1"/>
-          <p:nvPr/>
-        </p:nvSpPr>
-        <p:spPr>
-          <a:xfrm>
-            <a:off x="742950" y="1636713"/>
-            <a:ext cx="7721069" cy="523220"/>
-          </a:xfrm>
-          <a:prstGeom prst="rect">
-            <a:avLst/>
-          </a:prstGeom>
-        </p:spPr>
-        <p:txBody>
-          <a:bodyPr rtlCol="0">
-            <a:spAutoFit/>
-          </a:bodyPr>
-          <a:lstStyle/>
-          <a:p>
-            <a:pPr marL="285750" indent="-285750">
-              <a:buFont typeface="Arial" panose="020B0604020202020204" pitchFamily="34" charset="0"/>
-              <a:buChar char="•"/>
-            </a:pPr>
-            <a:r>
-              <a:rPr lang="fr-FR" sz="2800"/>
-              <a:t>Create an Artificial Intelligence</a:t>
-            </a:r>
-          </a:p>
-        </p:txBody>
-      </p:sp>
-      <p:sp>
-        <p:nvSpPr>
-          <p:cNvPr id="9" name="ZoneTexte 8"/>
-          <p:cNvSpPr txBox="1"/>
-          <p:nvPr/>
-        </p:nvSpPr>
-        <p:spPr>
-          <a:xfrm>
-            <a:off x="-100627" y="3881901"/>
-            <a:ext cx="4444270" cy="523220"/>
-          </a:xfrm>
-          <a:prstGeom prst="rect">
-            <a:avLst/>
-          </a:prstGeom>
-        </p:spPr>
-        <p:txBody>
-          <a:bodyPr rtlCol="0">
-            <a:spAutoFit/>
-          </a:bodyPr>
-          <a:lstStyle/>
-          <a:p>
-            <a:pPr marL="285750" indent="-285750" algn="ctr">
-              <a:buFont typeface="Arial" panose="020B0604020202020204" pitchFamily="34" charset="0"/>
-              <a:buChar char="•"/>
-            </a:pPr>
-            <a:r>
-              <a:rPr lang="fr-FR" sz="2800">
-                <a:solidFill>
-                  <a:srgbClr val="000000"/>
-                </a:solidFill>
-                <a:latin typeface="Calibri"/>
-                <a:cs typeface="Helvetica" charset="0"/>
-              </a:rPr>
-              <a:t>MCTS </a:t>
-            </a:r>
-            <a:r>
-              <a:rPr lang="fr-FR" sz="2800"/>
-              <a:t>Algorithm</a:t>
-            </a:r>
-            <a:endParaRPr lang="fr-FR"/>
-          </a:p>
-        </p:txBody>
-      </p:sp>
-      <p:sp>
-        <p:nvSpPr>
-          <p:cNvPr id="10" name="ZoneTexte 9"/>
-          <p:cNvSpPr txBox="1"/>
-          <p:nvPr/>
-        </p:nvSpPr>
-        <p:spPr>
-          <a:xfrm>
-            <a:off x="330694" y="4802052"/>
-            <a:ext cx="5608285" cy="523875"/>
-          </a:xfrm>
-          <a:prstGeom prst="rect">
-            <a:avLst/>
-          </a:prstGeom>
-        </p:spPr>
-        <p:txBody>
-          <a:bodyPr rtlCol="0">
-            <a:spAutoFit/>
-          </a:bodyPr>
-          <a:lstStyle/>
-          <a:p>
-            <a:pPr marL="285750" indent="-285750" algn="ctr">
-              <a:buFont typeface="Arial" panose="020B0604020202020204" pitchFamily="34" charset="0"/>
-              <a:buChar char="•"/>
-            </a:pPr>
-            <a:r>
-              <a:rPr lang="fr-FR" sz="2800">
-                <a:solidFill>
-                  <a:srgbClr val="000000"/>
-                </a:solidFill>
-                <a:latin typeface="Calibri"/>
-                <a:cs typeface="Helvetica" charset="0"/>
-              </a:rPr>
-              <a:t>Optimization by parallelization </a:t>
-            </a:r>
-            <a:endParaRPr lang="fr-FR"/>
+            <a:r>
+              <a:rPr lang="fr-FR" b="1" dirty="0"/>
+              <a:t>Introduction</a:t>
+            </a:r>
           </a:p>
         </p:txBody>
       </p:sp>
@@ -5810,6 +5544,169 @@
               <a:t>2</a:t>
             </a:fld>
             <a:endParaRPr lang="de-DE"/>
+          </a:p>
+        </p:txBody>
+      </p:sp>
+      <p:sp>
+        <p:nvSpPr>
+          <p:cNvPr id="11" name="Espace réservé du contenu 2"/>
+          <p:cNvSpPr>
+            <a:spLocks noGrp="1"/>
+          </p:cNvSpPr>
+          <p:nvPr>
+            <p:ph idx="1"/>
+          </p:nvPr>
+        </p:nvSpPr>
+        <p:spPr>
+          <a:xfrm>
+            <a:off x="631466" y="2110618"/>
+            <a:ext cx="6093529" cy="2571446"/>
+          </a:xfrm>
+        </p:spPr>
+        <p:txBody>
+          <a:bodyPr>
+            <a:noAutofit/>
+          </a:bodyPr>
+          <a:lstStyle/>
+          <a:p>
+            <a:r>
+              <a:rPr lang="fr-FR" sz="2400" dirty="0" err="1"/>
+              <a:t>Implementation</a:t>
+            </a:r>
+            <a:r>
+              <a:rPr lang="fr-FR" sz="2400" dirty="0"/>
+              <a:t> of an </a:t>
+            </a:r>
+            <a:r>
+              <a:rPr lang="fr-FR" sz="2400" dirty="0" err="1"/>
+              <a:t>artificial</a:t>
+            </a:r>
+            <a:r>
+              <a:rPr lang="fr-FR" sz="2400" dirty="0"/>
+              <a:t> intelligence for </a:t>
+            </a:r>
+            <a:r>
+              <a:rPr lang="fr-FR" sz="2400" dirty="0" err="1" smtClean="0"/>
+              <a:t>Arimaa</a:t>
+            </a:r>
+            <a:r>
+              <a:rPr lang="fr-FR" sz="2400" dirty="0" smtClean="0"/>
+              <a:t>.</a:t>
+            </a:r>
+          </a:p>
+          <a:p>
+            <a:pPr lvl="1">
+              <a:buFont typeface="Arial" panose="020B0604020202020204" pitchFamily="34" charset="0"/>
+              <a:buChar char="•"/>
+            </a:pPr>
+            <a:r>
+              <a:rPr lang="fr-FR" sz="2000" dirty="0" smtClean="0"/>
+              <a:t>Use of the </a:t>
+            </a:r>
+            <a:r>
+              <a:rPr lang="fr-FR" sz="2000" dirty="0"/>
+              <a:t>Monte </a:t>
+            </a:r>
+            <a:r>
+              <a:rPr lang="fr-FR" sz="2000" dirty="0" smtClean="0"/>
+              <a:t>Carlo </a:t>
+            </a:r>
+            <a:r>
+              <a:rPr lang="fr-FR" sz="2000" dirty="0" err="1"/>
+              <a:t>Tree</a:t>
+            </a:r>
+            <a:r>
+              <a:rPr lang="fr-FR" sz="2000" dirty="0"/>
+              <a:t> </a:t>
+            </a:r>
+            <a:r>
+              <a:rPr lang="fr-FR" sz="2000" dirty="0" err="1"/>
+              <a:t>Search</a:t>
+            </a:r>
+            <a:r>
+              <a:rPr lang="fr-FR" sz="2000" dirty="0"/>
+              <a:t> </a:t>
+            </a:r>
+            <a:r>
+              <a:rPr lang="fr-FR" sz="2000" dirty="0" err="1"/>
+              <a:t>algorithm</a:t>
+            </a:r>
+            <a:endParaRPr lang="fr-FR" sz="2000" dirty="0"/>
+          </a:p>
+          <a:p>
+            <a:pPr lvl="1">
+              <a:buFont typeface="Arial" panose="020B0604020202020204" pitchFamily="34" charset="0"/>
+              <a:buChar char="•"/>
+            </a:pPr>
+            <a:r>
+              <a:rPr lang="fr-FR" sz="2000" dirty="0"/>
+              <a:t>Exploitation of </a:t>
+            </a:r>
+            <a:r>
+              <a:rPr lang="en-US" sz="2000" dirty="0"/>
+              <a:t>parallelization on a set of clusters of </a:t>
+            </a:r>
+            <a:r>
+              <a:rPr lang="fr-FR" sz="2000" dirty="0"/>
+              <a:t>multi-</a:t>
+            </a:r>
+            <a:r>
+              <a:rPr lang="fr-FR" sz="2000" dirty="0" err="1"/>
+              <a:t>core</a:t>
+            </a:r>
+            <a:r>
+              <a:rPr lang="fr-FR" sz="2000" dirty="0"/>
+              <a:t> </a:t>
+            </a:r>
+            <a:r>
+              <a:rPr lang="fr-FR" sz="2000" dirty="0" smtClean="0"/>
+              <a:t>machines</a:t>
+            </a:r>
+          </a:p>
+          <a:p>
+            <a:pPr marL="320040" lvl="1" indent="0">
+              <a:buNone/>
+            </a:pPr>
+            <a:endParaRPr lang="fr-FR" sz="2000" dirty="0"/>
+          </a:p>
+          <a:p>
+            <a:r>
+              <a:rPr lang="fr-FR" sz="2400" dirty="0" err="1"/>
+              <a:t>Creation</a:t>
+            </a:r>
+            <a:r>
+              <a:rPr lang="fr-FR" sz="2400" dirty="0"/>
+              <a:t> of </a:t>
+            </a:r>
+            <a:r>
+              <a:rPr lang="fr-FR" sz="2400" dirty="0" smtClean="0"/>
+              <a:t>an </a:t>
+            </a:r>
+            <a:r>
+              <a:rPr lang="fr-FR" sz="2400" dirty="0"/>
+              <a:t>user interface to test the </a:t>
+            </a:r>
+            <a:r>
+              <a:rPr lang="fr-FR" sz="2400" dirty="0" err="1"/>
+              <a:t>algorithm</a:t>
+            </a:r>
+            <a:r>
+              <a:rPr lang="fr-FR" sz="2400" dirty="0"/>
+              <a:t> </a:t>
+            </a:r>
+            <a:r>
+              <a:rPr lang="fr-FR" sz="2400" dirty="0" err="1"/>
+              <a:t>against</a:t>
+            </a:r>
+            <a:r>
+              <a:rPr lang="fr-FR" sz="2400" dirty="0"/>
+              <a:t> </a:t>
+            </a:r>
+            <a:r>
+              <a:rPr lang="fr-FR" sz="2400" dirty="0" err="1"/>
+              <a:t>humans</a:t>
+            </a:r>
+            <a:endParaRPr lang="fr-FR" sz="2400" dirty="0"/>
           </a:p>
         </p:txBody>
       </p:sp>
@@ -6150,22 +6047,22 @@
           </a:lstStyle>
           <a:p>
             <a:r>
-              <a:rPr lang="en-US" dirty="0">
+              <a:rPr lang="en-US" b="1" dirty="0" smtClean="0">
                 <a:solidFill>
                   <a:srgbClr val="FF0000"/>
                 </a:solidFill>
               </a:rPr>
-              <a:t>Development </a:t>
-            </a:r>
-            <a:r>
-              <a:rPr lang="en-US" dirty="0" smtClean="0">
+              <a:t>1. Development </a:t>
+            </a:r>
+            <a:r>
+              <a:rPr lang="en-US" b="1" dirty="0" smtClean="0">
                 <a:solidFill>
                   <a:srgbClr val="FF0000"/>
                 </a:solidFill>
               </a:rPr>
               <a:t>Methodologies</a:t>
             </a:r>
-            <a:endParaRPr lang="fr-FR" dirty="0">
+            <a:endParaRPr lang="fr-FR" b="1" dirty="0">
               <a:solidFill>
                 <a:srgbClr val="FF0000"/>
               </a:solidFill>
@@ -6184,7 +6081,7 @@
     <a:masterClrMapping/>
   </p:clrMapOvr>
   <p:transition spd="slow">
-    <p:push/>
+    <p:push dir="u"/>
   </p:transition>
   <p:timing>
     <p:tnLst>
@@ -6303,63 +6200,6 @@
               <a:buNone/>
             </a:pPr>
             <a:endParaRPr lang="en-US" dirty="0"/>
-          </a:p>
-        </p:txBody>
-      </p:sp>
-      <p:sp>
-        <p:nvSpPr>
-          <p:cNvPr id="4" name="Titre 1"/>
-          <p:cNvSpPr txBox="1">
-            <a:spLocks/>
-          </p:cNvSpPr>
-          <p:nvPr/>
-        </p:nvSpPr>
-        <p:spPr>
-          <a:xfrm>
-            <a:off x="531976" y="340254"/>
-            <a:ext cx="10692221" cy="876623"/>
-          </a:xfrm>
-          <a:prstGeom prst="rect">
-            <a:avLst/>
-          </a:prstGeom>
-        </p:spPr>
-        <p:txBody>
-          <a:bodyPr vert="horz" lIns="91440" tIns="45720" rIns="91440" bIns="45720" rtlCol="0" anchor="ctr">
-            <a:normAutofit/>
-          </a:bodyPr>
-          <a:lstStyle>
-            <a:lvl1pPr algn="l" defTabSz="914400" rtl="0" eaLnBrk="1" latinLnBrk="0" hangingPunct="1">
-              <a:lnSpc>
-                <a:spcPct val="90000"/>
-              </a:lnSpc>
-              <a:spcBef>
-                <a:spcPct val="0"/>
-              </a:spcBef>
-              <a:buNone/>
-              <a:defRPr sz="4400" kern="1200">
-                <a:solidFill>
-                  <a:schemeClr val="tx1"/>
-                </a:solidFill>
-                <a:latin typeface="+mj-lt"/>
-                <a:ea typeface="+mj-ea"/>
-                <a:cs typeface="+mj-cs"/>
-              </a:defRPr>
-            </a:lvl1pPr>
-          </a:lstStyle>
-          <a:p>
-            <a:r>
-              <a:rPr lang="en-US" sz="4000" b="1" dirty="0">
-                <a:solidFill>
-                  <a:srgbClr val="FF0000"/>
-                </a:solidFill>
-              </a:rPr>
-              <a:t>Development Methodologies</a:t>
-            </a:r>
-            <a:endParaRPr lang="fr-FR" sz="4000" b="1" dirty="0">
-              <a:solidFill>
-                <a:srgbClr val="FF0000"/>
-              </a:solidFill>
-            </a:endParaRPr>
           </a:p>
         </p:txBody>
       </p:sp>
@@ -6416,6 +6256,124 @@
           </a:prstGeom>
         </p:spPr>
       </p:pic>
+      <p:sp>
+        <p:nvSpPr>
+          <p:cNvPr id="7" name="Titre 1"/>
+          <p:cNvSpPr txBox="1">
+            <a:spLocks/>
+          </p:cNvSpPr>
+          <p:nvPr/>
+        </p:nvSpPr>
+        <p:spPr>
+          <a:xfrm>
+            <a:off x="615043" y="0"/>
+            <a:ext cx="9753600" cy="1154097"/>
+          </a:xfrm>
+          <a:prstGeom prst="rect">
+            <a:avLst/>
+          </a:prstGeom>
+        </p:spPr>
+        <p:txBody>
+          <a:bodyPr vert="horz" lIns="91440" tIns="45720" rIns="91440" bIns="45720" rtlCol="0" anchor="b">
+            <a:normAutofit/>
+          </a:bodyPr>
+          <a:lstStyle>
+            <a:lvl1pPr algn="l" defTabSz="914400" rtl="0" eaLnBrk="1" latinLnBrk="0" hangingPunct="1">
+              <a:spcBef>
+                <a:spcPct val="0"/>
+              </a:spcBef>
+              <a:buNone/>
+              <a:defRPr sz="4000" kern="1200">
+                <a:solidFill>
+                  <a:schemeClr val="tx2"/>
+                </a:solidFill>
+                <a:latin typeface="+mj-lt"/>
+                <a:ea typeface="+mj-ea"/>
+                <a:cs typeface="+mj-cs"/>
+              </a:defRPr>
+            </a:lvl1pPr>
+            <a:lvl2pPr eaLnBrk="1" hangingPunct="1">
+              <a:defRPr>
+                <a:solidFill>
+                  <a:schemeClr val="tx2"/>
+                </a:solidFill>
+              </a:defRPr>
+            </a:lvl2pPr>
+            <a:lvl3pPr eaLnBrk="1" hangingPunct="1">
+              <a:defRPr>
+                <a:solidFill>
+                  <a:schemeClr val="tx2"/>
+                </a:solidFill>
+              </a:defRPr>
+            </a:lvl3pPr>
+            <a:lvl4pPr eaLnBrk="1" hangingPunct="1">
+              <a:defRPr>
+                <a:solidFill>
+                  <a:schemeClr val="tx2"/>
+                </a:solidFill>
+              </a:defRPr>
+            </a:lvl4pPr>
+            <a:lvl5pPr eaLnBrk="1" hangingPunct="1">
+              <a:defRPr>
+                <a:solidFill>
+                  <a:schemeClr val="tx2"/>
+                </a:solidFill>
+              </a:defRPr>
+            </a:lvl5pPr>
+            <a:lvl6pPr eaLnBrk="1" hangingPunct="1">
+              <a:defRPr>
+                <a:solidFill>
+                  <a:schemeClr val="tx2"/>
+                </a:solidFill>
+              </a:defRPr>
+            </a:lvl6pPr>
+            <a:lvl7pPr eaLnBrk="1" hangingPunct="1">
+              <a:defRPr>
+                <a:solidFill>
+                  <a:schemeClr val="tx2"/>
+                </a:solidFill>
+              </a:defRPr>
+            </a:lvl7pPr>
+            <a:lvl8pPr eaLnBrk="1" hangingPunct="1">
+              <a:defRPr>
+                <a:solidFill>
+                  <a:schemeClr val="tx2"/>
+                </a:solidFill>
+              </a:defRPr>
+            </a:lvl8pPr>
+            <a:lvl9pPr eaLnBrk="1" hangingPunct="1">
+              <a:defRPr>
+                <a:solidFill>
+                  <a:schemeClr val="tx2"/>
+                </a:solidFill>
+              </a:defRPr>
+            </a:lvl9pPr>
+          </a:lstStyle>
+          <a:p>
+            <a:r>
+              <a:rPr lang="en-US" b="1" dirty="0" smtClean="0">
+                <a:solidFill>
+                  <a:srgbClr val="FF0000"/>
+                </a:solidFill>
+              </a:rPr>
+              <a:t>1. Development </a:t>
+            </a:r>
+            <a:r>
+              <a:rPr lang="en-US" b="1" dirty="0" smtClean="0">
+                <a:solidFill>
+                  <a:srgbClr val="FF0000"/>
+                </a:solidFill>
+              </a:rPr>
+              <a:t>Methodologies</a:t>
+            </a:r>
+            <a:endParaRPr lang="fr-FR" b="1" dirty="0">
+              <a:solidFill>
+                <a:srgbClr val="FF0000"/>
+              </a:solidFill>
+            </a:endParaRPr>
+          </a:p>
+        </p:txBody>
+      </p:sp>
     </p:spTree>
     <p:extLst>
       <p:ext uri="{BB962C8B-B14F-4D97-AF65-F5344CB8AC3E}">
@@ -6617,63 +6575,6 @@
           </a:prstGeom>
         </p:spPr>
       </p:pic>
-      <p:sp>
-        <p:nvSpPr>
-          <p:cNvPr id="6" name="Titre 1"/>
-          <p:cNvSpPr txBox="1">
-            <a:spLocks/>
-          </p:cNvSpPr>
-          <p:nvPr/>
-        </p:nvSpPr>
-        <p:spPr>
-          <a:xfrm>
-            <a:off x="531976" y="340254"/>
-            <a:ext cx="10692221" cy="876623"/>
-          </a:xfrm>
-          <a:prstGeom prst="rect">
-            <a:avLst/>
-          </a:prstGeom>
-        </p:spPr>
-        <p:txBody>
-          <a:bodyPr vert="horz" lIns="91440" tIns="45720" rIns="91440" bIns="45720" rtlCol="0" anchor="ctr">
-            <a:normAutofit/>
-          </a:bodyPr>
-          <a:lstStyle>
-            <a:lvl1pPr algn="l" defTabSz="914400" rtl="0" eaLnBrk="1" latinLnBrk="0" hangingPunct="1">
-              <a:lnSpc>
-                <a:spcPct val="90000"/>
-              </a:lnSpc>
-              <a:spcBef>
-                <a:spcPct val="0"/>
-              </a:spcBef>
-              <a:buNone/>
-              <a:defRPr sz="4400" kern="1200">
-                <a:solidFill>
-                  <a:schemeClr val="tx1"/>
-                </a:solidFill>
-                <a:latin typeface="+mj-lt"/>
-                <a:ea typeface="+mj-ea"/>
-                <a:cs typeface="+mj-cs"/>
-              </a:defRPr>
-            </a:lvl1pPr>
-          </a:lstStyle>
-          <a:p>
-            <a:r>
-              <a:rPr lang="en-US" sz="4000" b="1" dirty="0">
-                <a:solidFill>
-                  <a:srgbClr val="FF0000"/>
-                </a:solidFill>
-              </a:rPr>
-              <a:t>Development Methodologies</a:t>
-            </a:r>
-            <a:endParaRPr lang="fr-FR" sz="4000" b="1" dirty="0">
-              <a:solidFill>
-                <a:srgbClr val="FF0000"/>
-              </a:solidFill>
-            </a:endParaRPr>
-          </a:p>
-        </p:txBody>
-      </p:sp>
       <p:sp>
         <p:nvSpPr>
           <p:cNvPr id="7" name="Slide Number Placeholder 6"/>
@@ -7149,6 +7050,124 @@
           </a:graphicData>
         </a:graphic>
       </p:graphicFrame>
+      <p:sp>
+        <p:nvSpPr>
+          <p:cNvPr id="9" name="Titre 1"/>
+          <p:cNvSpPr txBox="1">
+            <a:spLocks/>
+          </p:cNvSpPr>
+          <p:nvPr/>
+        </p:nvSpPr>
+        <p:spPr>
+          <a:xfrm>
+            <a:off x="615043" y="0"/>
+            <a:ext cx="9753600" cy="1154097"/>
+          </a:xfrm>
+          <a:prstGeom prst="rect">
+            <a:avLst/>
+          </a:prstGeom>
+        </p:spPr>
+        <p:txBody>
+          <a:bodyPr vert="horz" lIns="91440" tIns="45720" rIns="91440" bIns="45720" rtlCol="0" anchor="b">
+            <a:normAutofit/>
+          </a:bodyPr>
+          <a:lstStyle>
+            <a:lvl1pPr algn="l" defTabSz="914400" rtl="0" eaLnBrk="1" latinLnBrk="0" hangingPunct="1">
+              <a:spcBef>
+                <a:spcPct val="0"/>
+              </a:spcBef>
+              <a:buNone/>
+              <a:defRPr sz="4000" kern="1200">
+                <a:solidFill>
+                  <a:schemeClr val="tx2"/>
+                </a:solidFill>
+                <a:latin typeface="+mj-lt"/>
+                <a:ea typeface="+mj-ea"/>
+                <a:cs typeface="+mj-cs"/>
+              </a:defRPr>
+            </a:lvl1pPr>
+            <a:lvl2pPr eaLnBrk="1" hangingPunct="1">
+              <a:defRPr>
+                <a:solidFill>
+                  <a:schemeClr val="tx2"/>
+                </a:solidFill>
+              </a:defRPr>
+            </a:lvl2pPr>
+            <a:lvl3pPr eaLnBrk="1" hangingPunct="1">
+              <a:defRPr>
+                <a:solidFill>
+                  <a:schemeClr val="tx2"/>
+                </a:solidFill>
+              </a:defRPr>
+            </a:lvl3pPr>
+            <a:lvl4pPr eaLnBrk="1" hangingPunct="1">
+              <a:defRPr>
+                <a:solidFill>
+                  <a:schemeClr val="tx2"/>
+                </a:solidFill>
+              </a:defRPr>
+            </a:lvl4pPr>
+            <a:lvl5pPr eaLnBrk="1" hangingPunct="1">
+              <a:defRPr>
+                <a:solidFill>
+                  <a:schemeClr val="tx2"/>
+                </a:solidFill>
+              </a:defRPr>
+            </a:lvl5pPr>
+            <a:lvl6pPr eaLnBrk="1" hangingPunct="1">
+              <a:defRPr>
+                <a:solidFill>
+                  <a:schemeClr val="tx2"/>
+                </a:solidFill>
+              </a:defRPr>
+            </a:lvl6pPr>
+            <a:lvl7pPr eaLnBrk="1" hangingPunct="1">
+              <a:defRPr>
+                <a:solidFill>
+                  <a:schemeClr val="tx2"/>
+                </a:solidFill>
+              </a:defRPr>
+            </a:lvl7pPr>
+            <a:lvl8pPr eaLnBrk="1" hangingPunct="1">
+              <a:defRPr>
+                <a:solidFill>
+                  <a:schemeClr val="tx2"/>
+                </a:solidFill>
+              </a:defRPr>
+            </a:lvl8pPr>
+            <a:lvl9pPr eaLnBrk="1" hangingPunct="1">
+              <a:defRPr>
+                <a:solidFill>
+                  <a:schemeClr val="tx2"/>
+                </a:solidFill>
+              </a:defRPr>
+            </a:lvl9pPr>
+          </a:lstStyle>
+          <a:p>
+            <a:r>
+              <a:rPr lang="en-US" b="1" dirty="0" smtClean="0">
+                <a:solidFill>
+                  <a:srgbClr val="FF0000"/>
+                </a:solidFill>
+              </a:rPr>
+              <a:t>1. Development </a:t>
+            </a:r>
+            <a:r>
+              <a:rPr lang="en-US" b="1" dirty="0" smtClean="0">
+                <a:solidFill>
+                  <a:srgbClr val="FF0000"/>
+                </a:solidFill>
+              </a:rPr>
+              <a:t>Methodologies</a:t>
+            </a:r>
+            <a:endParaRPr lang="fr-FR" b="1" dirty="0">
+              <a:solidFill>
+                <a:srgbClr val="FF0000"/>
+              </a:solidFill>
+            </a:endParaRPr>
+          </a:p>
+        </p:txBody>
+      </p:sp>
     </p:spTree>
     <p:extLst>
       <p:ext uri="{BB962C8B-B14F-4D97-AF65-F5344CB8AC3E}">
@@ -7426,63 +7445,6 @@
       </p:sp>
       <p:sp>
         <p:nvSpPr>
-          <p:cNvPr id="6" name="Titre 1"/>
-          <p:cNvSpPr txBox="1">
-            <a:spLocks/>
-          </p:cNvSpPr>
-          <p:nvPr/>
-        </p:nvSpPr>
-        <p:spPr>
-          <a:xfrm>
-            <a:off x="531976" y="340254"/>
-            <a:ext cx="10692221" cy="876623"/>
-          </a:xfrm>
-          <a:prstGeom prst="rect">
-            <a:avLst/>
-          </a:prstGeom>
-        </p:spPr>
-        <p:txBody>
-          <a:bodyPr vert="horz" lIns="91440" tIns="45720" rIns="91440" bIns="45720" rtlCol="0" anchor="ctr">
-            <a:normAutofit/>
-          </a:bodyPr>
-          <a:lstStyle>
-            <a:lvl1pPr algn="l" defTabSz="914400" rtl="0" eaLnBrk="1" latinLnBrk="0" hangingPunct="1">
-              <a:lnSpc>
-                <a:spcPct val="90000"/>
-              </a:lnSpc>
-              <a:spcBef>
-                <a:spcPct val="0"/>
-              </a:spcBef>
-              <a:buNone/>
-              <a:defRPr sz="4400" kern="1200">
-                <a:solidFill>
-                  <a:schemeClr val="tx1"/>
-                </a:solidFill>
-                <a:latin typeface="+mj-lt"/>
-                <a:ea typeface="+mj-ea"/>
-                <a:cs typeface="+mj-cs"/>
-              </a:defRPr>
-            </a:lvl1pPr>
-          </a:lstStyle>
-          <a:p>
-            <a:r>
-              <a:rPr lang="en-US" sz="4000" b="1" dirty="0">
-                <a:solidFill>
-                  <a:srgbClr val="FF0000"/>
-                </a:solidFill>
-              </a:rPr>
-              <a:t>Development Methodologies</a:t>
-            </a:r>
-            <a:endParaRPr lang="fr-FR" sz="4000" b="1" dirty="0">
-              <a:solidFill>
-                <a:srgbClr val="FF0000"/>
-              </a:solidFill>
-            </a:endParaRPr>
-          </a:p>
-        </p:txBody>
-      </p:sp>
-      <p:sp>
-        <p:nvSpPr>
           <p:cNvPr id="7" name="Content Placeholder 2"/>
           <p:cNvSpPr txBox="1">
             <a:spLocks/>
@@ -7696,6 +7658,124 @@
               <a:buNone/>
             </a:pPr>
             <a:endParaRPr lang="en-US" dirty="0"/>
+          </a:p>
+        </p:txBody>
+      </p:sp>
+      <p:sp>
+        <p:nvSpPr>
+          <p:cNvPr id="9" name="Titre 1"/>
+          <p:cNvSpPr txBox="1">
+            <a:spLocks/>
+          </p:cNvSpPr>
+          <p:nvPr/>
+        </p:nvSpPr>
+        <p:spPr>
+          <a:xfrm>
+            <a:off x="615043" y="0"/>
+            <a:ext cx="9753600" cy="1154097"/>
+          </a:xfrm>
+          <a:prstGeom prst="rect">
+            <a:avLst/>
+          </a:prstGeom>
+        </p:spPr>
+        <p:txBody>
+          <a:bodyPr vert="horz" lIns="91440" tIns="45720" rIns="91440" bIns="45720" rtlCol="0" anchor="b">
+            <a:normAutofit/>
+          </a:bodyPr>
+          <a:lstStyle>
+            <a:lvl1pPr algn="l" defTabSz="914400" rtl="0" eaLnBrk="1" latinLnBrk="0" hangingPunct="1">
+              <a:spcBef>
+                <a:spcPct val="0"/>
+              </a:spcBef>
+              <a:buNone/>
+              <a:defRPr sz="4000" kern="1200">
+                <a:solidFill>
+                  <a:schemeClr val="tx2"/>
+                </a:solidFill>
+                <a:latin typeface="+mj-lt"/>
+                <a:ea typeface="+mj-ea"/>
+                <a:cs typeface="+mj-cs"/>
+              </a:defRPr>
+            </a:lvl1pPr>
+            <a:lvl2pPr eaLnBrk="1" hangingPunct="1">
+              <a:defRPr>
+                <a:solidFill>
+                  <a:schemeClr val="tx2"/>
+                </a:solidFill>
+              </a:defRPr>
+            </a:lvl2pPr>
+            <a:lvl3pPr eaLnBrk="1" hangingPunct="1">
+              <a:defRPr>
+                <a:solidFill>
+                  <a:schemeClr val="tx2"/>
+                </a:solidFill>
+              </a:defRPr>
+            </a:lvl3pPr>
+            <a:lvl4pPr eaLnBrk="1" hangingPunct="1">
+              <a:defRPr>
+                <a:solidFill>
+                  <a:schemeClr val="tx2"/>
+                </a:solidFill>
+              </a:defRPr>
+            </a:lvl4pPr>
+            <a:lvl5pPr eaLnBrk="1" hangingPunct="1">
+              <a:defRPr>
+                <a:solidFill>
+                  <a:schemeClr val="tx2"/>
+                </a:solidFill>
+              </a:defRPr>
+            </a:lvl5pPr>
+            <a:lvl6pPr eaLnBrk="1" hangingPunct="1">
+              <a:defRPr>
+                <a:solidFill>
+                  <a:schemeClr val="tx2"/>
+                </a:solidFill>
+              </a:defRPr>
+            </a:lvl6pPr>
+            <a:lvl7pPr eaLnBrk="1" hangingPunct="1">
+              <a:defRPr>
+                <a:solidFill>
+                  <a:schemeClr val="tx2"/>
+                </a:solidFill>
+              </a:defRPr>
+            </a:lvl7pPr>
+            <a:lvl8pPr eaLnBrk="1" hangingPunct="1">
+              <a:defRPr>
+                <a:solidFill>
+                  <a:schemeClr val="tx2"/>
+                </a:solidFill>
+              </a:defRPr>
+            </a:lvl8pPr>
+            <a:lvl9pPr eaLnBrk="1" hangingPunct="1">
+              <a:defRPr>
+                <a:solidFill>
+                  <a:schemeClr val="tx2"/>
+                </a:solidFill>
+              </a:defRPr>
+            </a:lvl9pPr>
+          </a:lstStyle>
+          <a:p>
+            <a:r>
+              <a:rPr lang="en-US" b="1" dirty="0" smtClean="0">
+                <a:solidFill>
+                  <a:srgbClr val="FF0000"/>
+                </a:solidFill>
+              </a:rPr>
+              <a:t>1. Development </a:t>
+            </a:r>
+            <a:r>
+              <a:rPr lang="en-US" b="1" dirty="0" smtClean="0">
+                <a:solidFill>
+                  <a:srgbClr val="FF0000"/>
+                </a:solidFill>
+              </a:rPr>
+              <a:t>Methodologies</a:t>
+            </a:r>
+            <a:endParaRPr lang="fr-FR" b="1" dirty="0">
+              <a:solidFill>
+                <a:srgbClr val="FF0000"/>
+              </a:solidFill>
+            </a:endParaRPr>
           </a:p>
         </p:txBody>
       </p:sp>
@@ -8187,9 +8267,14 @@
           <a:lstStyle/>
           <a:p>
             <a:r>
-              <a:rPr lang="fr-FR"/>
+              <a:rPr lang="fr-FR" b="1" dirty="0" smtClean="0"/>
+              <a:t>2. </a:t>
+            </a:r>
+            <a:r>
+              <a:rPr lang="fr-FR" b="1" dirty="0" err="1" smtClean="0"/>
               <a:t>Environment</a:t>
             </a:r>
+            <a:endParaRPr lang="fr-FR" b="1" dirty="0"/>
           </a:p>
         </p:txBody>
       </p:sp>
@@ -8203,37 +8288,44 @@
             <p:ph sz="quarter" idx="13"/>
           </p:nvPr>
         </p:nvSpPr>
-        <p:spPr/>
-        <p:txBody>
-          <a:bodyPr/>
+        <p:spPr>
+          <a:xfrm>
+            <a:off x="1235529" y="1812472"/>
+            <a:ext cx="4754880" cy="3593592"/>
+          </a:xfrm>
+        </p:spPr>
+        <p:txBody>
+          <a:bodyPr>
+            <a:normAutofit/>
+          </a:bodyPr>
           <a:lstStyle/>
           <a:p>
             <a:pPr marL="0" indent="0">
               <a:buNone/>
             </a:pPr>
             <a:r>
-              <a:rPr lang="en-US" b="1"/>
+              <a:rPr lang="en-US" sz="2400" b="1" dirty="0"/>
               <a:t>Human resources:</a:t>
             </a:r>
           </a:p>
           <a:p>
-            <a:endParaRPr lang="en-US"/>
-          </a:p>
-          <a:p>
-            <a:r>
-              <a:rPr lang="en-US"/>
+            <a:endParaRPr lang="en-US" sz="2400" dirty="0"/>
+          </a:p>
+          <a:p>
+            <a:r>
+              <a:rPr lang="en-US" sz="2400" dirty="0"/>
               <a:t>Team of 6 until January</a:t>
             </a:r>
           </a:p>
           <a:p>
-            <a:endParaRPr lang="en-US"/>
-          </a:p>
-          <a:p>
-            <a:r>
-              <a:rPr lang="en-US"/>
+            <a:endParaRPr lang="en-US" sz="2400" dirty="0"/>
+          </a:p>
+          <a:p>
+            <a:r>
+              <a:rPr lang="en-US" sz="2400" dirty="0"/>
               <a:t>Team of 3 after January</a:t>
             </a:r>
-            <a:endParaRPr lang="fr-FR"/>
+            <a:endParaRPr lang="fr-FR" sz="2400" dirty="0"/>
           </a:p>
         </p:txBody>
       </p:sp>
@@ -8247,41 +8339,48 @@
             <p:ph sz="quarter" idx="14"/>
           </p:nvPr>
         </p:nvSpPr>
-        <p:spPr/>
-        <p:txBody>
-          <a:bodyPr/>
+        <p:spPr>
+          <a:xfrm>
+            <a:off x="6225975" y="1771651"/>
+            <a:ext cx="4754880" cy="3595687"/>
+          </a:xfrm>
+        </p:spPr>
+        <p:txBody>
+          <a:bodyPr>
+            <a:normAutofit/>
+          </a:bodyPr>
           <a:lstStyle/>
           <a:p>
             <a:pPr marL="0" indent="0">
               <a:buNone/>
             </a:pPr>
             <a:r>
-              <a:rPr lang="en-US" b="1"/>
+              <a:rPr lang="en-US" sz="2400" b="1" dirty="0"/>
               <a:t>Technological resources:</a:t>
             </a:r>
           </a:p>
           <a:p>
-            <a:endParaRPr lang="en-US"/>
-          </a:p>
-          <a:p>
-            <a:r>
-              <a:rPr lang="en-US"/>
+            <a:endParaRPr lang="en-US" sz="2400" dirty="0"/>
+          </a:p>
+          <a:p>
+            <a:r>
+              <a:rPr lang="en-US" sz="2400" dirty="0"/>
               <a:t>Computers from INSA's computer science department</a:t>
             </a:r>
           </a:p>
           <a:p>
-            <a:endParaRPr lang="en-US"/>
-          </a:p>
-          <a:p>
-            <a:r>
-              <a:rPr lang="en-US" i="1"/>
+            <a:endParaRPr lang="en-US" sz="2400" dirty="0"/>
+          </a:p>
+          <a:p>
+            <a:r>
+              <a:rPr lang="en-US" sz="2400" i="1" dirty="0"/>
               <a:t>Grid'5000</a:t>
             </a:r>
             <a:r>
-              <a:rPr lang="en-US"/>
+              <a:rPr lang="en-US" sz="2400" dirty="0"/>
               <a:t>, a set of clusters of multi-core machines</a:t>
             </a:r>
-            <a:endParaRPr lang="fr-FR"/>
+            <a:endParaRPr lang="fr-FR" sz="2400" dirty="0"/>
           </a:p>
         </p:txBody>
       </p:sp>
@@ -8364,9 +8463,22 @@
           <a:lstStyle/>
           <a:p>
             <a:r>
-              <a:rPr lang="fr-FR"/>
-              <a:t>Risks analysis</a:t>
-            </a:r>
+              <a:rPr lang="fr-FR" b="1" dirty="0" smtClean="0"/>
+              <a:t>3. </a:t>
+            </a:r>
+            <a:r>
+              <a:rPr lang="fr-FR" b="1" dirty="0" err="1" smtClean="0"/>
+              <a:t>Risks</a:t>
+            </a:r>
+            <a:r>
+              <a:rPr lang="fr-FR" b="1" dirty="0" smtClean="0"/>
+              <a:t> </a:t>
+            </a:r>
+            <a:r>
+              <a:rPr lang="fr-FR" b="1" dirty="0" err="1"/>
+              <a:t>analysis</a:t>
+            </a:r>
+            <a:endParaRPr lang="fr-FR" b="1" dirty="0"/>
           </a:p>
         </p:txBody>
       </p:sp>
@@ -8382,103 +8494,120 @@
         </p:nvSpPr>
         <p:spPr>
           <a:xfrm>
-            <a:off x="838200" y="1825625"/>
-            <a:ext cx="3724275" cy="4351338"/>
+            <a:off x="1013726" y="2588080"/>
+            <a:ext cx="3724275" cy="2411639"/>
           </a:xfrm>
         </p:spPr>
         <p:txBody>
-          <a:bodyPr/>
+          <a:bodyPr>
+            <a:noAutofit/>
+          </a:bodyPr>
           <a:lstStyle/>
           <a:p>
-            <a:pPr marL="0" indent="0">
-              <a:buNone/>
+            <a:pPr marL="457200" indent="-457200">
+              <a:buFont typeface="+mj-lt"/>
+              <a:buAutoNum type="arabicPeriod"/>
             </a:pPr>
             <a:r>
-              <a:rPr lang="en-US">
+              <a:rPr lang="en-US" sz="2400" dirty="0" smtClean="0">
                 <a:solidFill>
                   <a:srgbClr val="000000"/>
                 </a:solidFill>
                 <a:latin typeface="Calibri"/>
               </a:rPr>
-              <a:t>Kinds of risk:</a:t>
-            </a:r>
-          </a:p>
-          <a:p>
-            <a:pPr marL="0" indent="0">
-              <a:buNone/>
-            </a:pPr>
-            <a:r>
-              <a:rPr lang="en-US">
-                <a:solidFill>
-                  <a:srgbClr val="000000"/>
-                </a:solidFill>
-                <a:latin typeface="Calibri"/>
-              </a:rPr>
-              <a:t>1) Resources</a:t>
-            </a:r>
-          </a:p>
-          <a:p>
-            <a:pPr marL="0" indent="0">
-              <a:buNone/>
-            </a:pPr>
-            <a:r>
-              <a:rPr lang="en-US">
-                <a:solidFill>
-                  <a:srgbClr val="000000"/>
-                </a:solidFill>
-                <a:latin typeface="Calibri"/>
-              </a:rPr>
-              <a:t>2) Organisation</a:t>
-            </a:r>
-          </a:p>
-          <a:p>
-            <a:pPr marL="0" indent="0">
-              <a:buNone/>
-            </a:pPr>
-            <a:r>
-              <a:rPr lang="en-US">
-                <a:solidFill>
-                  <a:srgbClr val="000000"/>
-                </a:solidFill>
-                <a:latin typeface="Calibri"/>
-              </a:rPr>
-              <a:t>3) Payments</a:t>
-            </a:r>
-          </a:p>
-          <a:p>
-            <a:pPr marL="0" indent="0">
-              <a:buNone/>
-            </a:pPr>
-            <a:r>
-              <a:rPr lang="en-US">
-                <a:solidFill>
-                  <a:srgbClr val="000000"/>
-                </a:solidFill>
-                <a:latin typeface="Calibri"/>
-              </a:rPr>
-              <a:t>4) Suppliers/Purchases</a:t>
-            </a:r>
-          </a:p>
-          <a:p>
-            <a:pPr marL="0" indent="0">
-              <a:buNone/>
-            </a:pPr>
-            <a:r>
-              <a:rPr lang="en-US">
-                <a:solidFill>
-                  <a:srgbClr val="000000"/>
-                </a:solidFill>
-                <a:latin typeface="Calibri"/>
-              </a:rPr>
-              <a:t>5) Technical</a:t>
-            </a:r>
-            <a:endParaRPr lang="fr-FR">
+              <a:t>Resources</a:t>
+            </a:r>
+            <a:endParaRPr lang="en-US" sz="2400" dirty="0">
               <a:solidFill>
                 <a:srgbClr val="000000"/>
               </a:solidFill>
               <a:latin typeface="Calibri"/>
             </a:endParaRPr>
           </a:p>
+          <a:p>
+            <a:pPr marL="457200" indent="-457200">
+              <a:buFont typeface="+mj-lt"/>
+              <a:buAutoNum type="arabicPeriod"/>
+            </a:pPr>
+            <a:r>
+              <a:rPr lang="en-US" sz="2400" dirty="0" err="1" smtClean="0">
+                <a:solidFill>
+                  <a:srgbClr val="000000"/>
+                </a:solidFill>
+                <a:latin typeface="Calibri"/>
+              </a:rPr>
+              <a:t>Organisation</a:t>
+            </a:r>
+            <a:endParaRPr lang="en-US" sz="2400" dirty="0">
+              <a:solidFill>
+                <a:srgbClr val="000000"/>
+              </a:solidFill>
+              <a:latin typeface="Calibri"/>
+            </a:endParaRPr>
+          </a:p>
+          <a:p>
+            <a:pPr marL="457200" indent="-457200">
+              <a:buFont typeface="+mj-lt"/>
+              <a:buAutoNum type="arabicPeriod"/>
+            </a:pPr>
+            <a:r>
+              <a:rPr lang="en-US" sz="2400" dirty="0" smtClean="0">
+                <a:solidFill>
+                  <a:srgbClr val="000000"/>
+                </a:solidFill>
+                <a:latin typeface="Calibri"/>
+              </a:rPr>
+              <a:t>Payments</a:t>
+            </a:r>
+            <a:endParaRPr lang="en-US" sz="2400" dirty="0">
+              <a:solidFill>
+                <a:srgbClr val="000000"/>
+              </a:solidFill>
+              <a:latin typeface="Calibri"/>
+            </a:endParaRPr>
+          </a:p>
+          <a:p>
+            <a:pPr marL="457200" indent="-457200">
+              <a:buFont typeface="+mj-lt"/>
+              <a:buAutoNum type="arabicPeriod"/>
+            </a:pPr>
+            <a:r>
+              <a:rPr lang="en-US" sz="2400" dirty="0" smtClean="0">
+                <a:solidFill>
+                  <a:srgbClr val="000000"/>
+                </a:solidFill>
+                <a:latin typeface="Calibri"/>
+              </a:rPr>
+              <a:t>Suppliers/Purchases</a:t>
+            </a:r>
+            <a:endParaRPr lang="en-US" sz="2400" dirty="0">
+              <a:solidFill>
+                <a:srgbClr val="000000"/>
+              </a:solidFill>
+              <a:latin typeface="Calibri"/>
+            </a:endParaRPr>
+          </a:p>
+          <a:p>
+            <a:pPr marL="457200" indent="-457200">
+              <a:buFont typeface="+mj-lt"/>
+              <a:buAutoNum type="arabicPeriod"/>
+            </a:pPr>
+            <a:r>
+              <a:rPr lang="en-US" sz="2400" dirty="0" smtClean="0">
+                <a:solidFill>
+                  <a:srgbClr val="000000"/>
+                </a:solidFill>
+                <a:latin typeface="Calibri"/>
+              </a:rPr>
+              <a:t>Technical</a:t>
+            </a:r>
+            <a:endParaRPr lang="fr-FR" sz="2400" dirty="0">
+              <a:solidFill>
+                <a:srgbClr val="000000"/>
+              </a:solidFill>
+              <a:latin typeface="Calibri"/>
+            </a:endParaRPr>
+          </a:p>
         </p:txBody>
       </p:sp>
       <p:sp>
@@ -8491,8 +8620,8 @@
         </p:nvSpPr>
         <p:spPr>
           <a:xfrm>
-            <a:off x="5324475" y="1819275"/>
-            <a:ext cx="6410325" cy="4351338"/>
+            <a:off x="4679492" y="2645230"/>
+            <a:ext cx="3819532" cy="2465614"/>
           </a:xfrm>
           <a:prstGeom prst="rect">
             <a:avLst/>
@@ -8667,11 +8796,23 @@
             </a:lvl9pPr>
           </a:lstStyle>
           <a:p>
-            <a:pPr marL="0" indent="0">
-              <a:buFont typeface="Arial" panose="020B0604020202020204" pitchFamily="34" charset="0"/>
-              <a:buNone/>
+            <a:pPr>
+              <a:buClr>
+                <a:srgbClr val="FF3300"/>
+              </a:buClr>
+              <a:buFont typeface="Wingdings" panose="05000000000000000000" pitchFamily="2" charset="2"/>
+              <a:buChar char="Ø"/>
             </a:pPr>
-            <a:endParaRPr lang="en-US">
+            <a:r>
+              <a:rPr lang="en-US" sz="2400" dirty="0" smtClean="0">
+                <a:solidFill>
+                  <a:srgbClr val="000000"/>
+                </a:solidFill>
+                <a:latin typeface="Calibri"/>
+              </a:rPr>
+              <a:t> Unavoidable</a:t>
+            </a:r>
+            <a:endParaRPr lang="en-US" sz="2400" dirty="0">
               <a:solidFill>
                 <a:srgbClr val="000000"/>
               </a:solidFill>
@@ -8679,64 +8820,85 @@
             </a:endParaRPr>
           </a:p>
           <a:p>
-            <a:pPr marL="0" indent="0">
-              <a:buFont typeface="Arial" panose="020B0604020202020204" pitchFamily="34" charset="0"/>
-              <a:buNone/>
+            <a:pPr>
+              <a:buClr>
+                <a:srgbClr val="FF3300"/>
+              </a:buClr>
+              <a:buFont typeface="Wingdings" panose="05000000000000000000" pitchFamily="2" charset="2"/>
+              <a:buChar char="ü"/>
             </a:pPr>
             <a:r>
-              <a:rPr lang="en-US">
+              <a:rPr lang="en-US" sz="2400" dirty="0" smtClean="0">
                 <a:solidFill>
                   <a:srgbClr val="000000"/>
                 </a:solidFill>
                 <a:latin typeface="Calibri"/>
               </a:rPr>
-              <a:t>=&gt; unavoidable</a:t>
-            </a:r>
-          </a:p>
-          <a:p>
-            <a:pPr marL="0" indent="0">
-              <a:buFont typeface="Arial" panose="020B0604020202020204" pitchFamily="34" charset="0"/>
-              <a:buNone/>
+              <a:t>None</a:t>
+            </a:r>
+            <a:endParaRPr lang="en-US" sz="2400" dirty="0">
+              <a:solidFill>
+                <a:srgbClr val="000000"/>
+              </a:solidFill>
+              <a:latin typeface="Calibri"/>
+            </a:endParaRPr>
+          </a:p>
+          <a:p>
+            <a:pPr>
+              <a:buClr>
+                <a:srgbClr val="FF3300"/>
+              </a:buClr>
+              <a:buFont typeface="Wingdings" panose="05000000000000000000" pitchFamily="2" charset="2"/>
+              <a:buChar char="ü"/>
             </a:pPr>
             <a:r>
-              <a:rPr lang="en-US">
-                <a:solidFill>
-                  <a:srgbClr val="000000"/>
-                </a:solidFill>
-                <a:latin typeface="Calibri"/>
-              </a:rPr>
-              <a:t>=&gt; none</a:t>
-            </a:r>
-          </a:p>
-          <a:p>
-            <a:pPr marL="0" indent="0">
-              <a:buFont typeface="Arial" panose="020B0604020202020204" pitchFamily="34" charset="0"/>
-              <a:buNone/>
-            </a:pPr>
-            <a:r>
-              <a:rPr lang="en-US">
+              <a:rPr lang="en-US" sz="2400" dirty="0" smtClean="0">
                 <a:solidFill>
                   <a:srgbClr val="000000"/>
                 </a:solidFill>
                 <a:latin typeface="Calibri" charset="0"/>
               </a:rPr>
-              <a:t>=&gt; none</a:t>
-            </a:r>
-          </a:p>
-          <a:p>
-            <a:pPr marL="0" indent="0">
-              <a:buFont typeface="Arial" panose="020B0604020202020204" pitchFamily="34" charset="0"/>
-              <a:buNone/>
+              <a:t>None</a:t>
+            </a:r>
+            <a:endParaRPr lang="en-US" sz="2400" dirty="0">
+              <a:solidFill>
+                <a:srgbClr val="000000"/>
+              </a:solidFill>
+              <a:latin typeface="Calibri" charset="0"/>
+            </a:endParaRPr>
+          </a:p>
+          <a:p>
+            <a:pPr>
+              <a:buClr>
+                <a:srgbClr val="FF3300"/>
+              </a:buClr>
+              <a:buFont typeface="Wingdings" panose="05000000000000000000" pitchFamily="2" charset="2"/>
+              <a:buChar char="ü"/>
             </a:pPr>
             <a:r>
-              <a:rPr lang="en-US">
+              <a:rPr lang="en-US" sz="2400" dirty="0">
                 <a:solidFill>
                   <a:srgbClr val="000000"/>
                 </a:solidFill>
                 <a:latin typeface="Calibri" charset="0"/>
               </a:rPr>
-              <a:t>=&gt; none</a:t>
-            </a:r>
+              <a:t>N</a:t>
+            </a:r>
+            <a:r>
+              <a:rPr lang="en-US" sz="2400" dirty="0" smtClean="0">
+                <a:solidFill>
+                  <a:srgbClr val="000000"/>
+                </a:solidFill>
+                <a:latin typeface="Calibri" charset="0"/>
+              </a:rPr>
+              <a:t>one</a:t>
+            </a:r>
+            <a:endParaRPr lang="en-US" sz="2400" dirty="0">
+              <a:solidFill>
+                <a:srgbClr val="000000"/>
+              </a:solidFill>
+              <a:latin typeface="Calibri" charset="0"/>
+            </a:endParaRPr>
           </a:p>
         </p:txBody>
       </p:sp>
@@ -8760,6 +8922,460 @@
               <a:t>8</a:t>
             </a:fld>
             <a:endParaRPr lang="de-DE"/>
+          </a:p>
+        </p:txBody>
+      </p:sp>
+      <p:sp>
+        <p:nvSpPr>
+          <p:cNvPr id="6" name="TextBox 5"/>
+          <p:cNvSpPr txBox="1"/>
+          <p:nvPr/>
+        </p:nvSpPr>
+        <p:spPr>
+          <a:xfrm>
+            <a:off x="1102178" y="1714853"/>
+            <a:ext cx="4335235" cy="523220"/>
+          </a:xfrm>
+          <a:prstGeom prst="rect">
+            <a:avLst/>
+          </a:prstGeom>
+          <a:noFill/>
+        </p:spPr>
+        <p:txBody>
+          <a:bodyPr wrap="square" rtlCol="0">
+            <a:spAutoFit/>
+          </a:bodyPr>
+          <a:lstStyle/>
+          <a:p>
+            <a:r>
+              <a:rPr lang="en-US" sz="2800" dirty="0">
+                <a:solidFill>
+                  <a:srgbClr val="FF3300"/>
+                </a:solidFill>
+              </a:rPr>
+              <a:t>Kinds of </a:t>
+            </a:r>
+            <a:r>
+              <a:rPr lang="en-US" sz="2800" dirty="0" smtClean="0">
+                <a:solidFill>
+                  <a:srgbClr val="FF3300"/>
+                </a:solidFill>
+              </a:rPr>
+              <a:t>risk :</a:t>
+            </a:r>
+            <a:endParaRPr lang="en-US" sz="2800" dirty="0">
+              <a:solidFill>
+                <a:srgbClr val="FF3300"/>
+              </a:solidFill>
+            </a:endParaRPr>
+          </a:p>
+        </p:txBody>
+      </p:sp>
+      <p:sp>
+        <p:nvSpPr>
+          <p:cNvPr id="9" name="Espace réservé du contenu 2"/>
+          <p:cNvSpPr txBox="1">
+            <a:spLocks/>
+          </p:cNvSpPr>
+          <p:nvPr/>
+        </p:nvSpPr>
+        <p:spPr>
+          <a:xfrm>
+            <a:off x="1981200" y="2808513"/>
+            <a:ext cx="9220200" cy="3838349"/>
+          </a:xfrm>
+          <a:prstGeom prst="rect">
+            <a:avLst/>
+          </a:prstGeom>
+        </p:spPr>
+        <p:txBody>
+          <a:bodyPr vert="horz" lIns="91440" tIns="45720" rIns="91440" bIns="45720" rtlCol="0">
+            <a:normAutofit/>
+          </a:bodyPr>
+          <a:lstStyle>
+            <a:lvl1pPr marL="228600" indent="-228600" algn="l" defTabSz="914400" rtl="0" eaLnBrk="1" latinLnBrk="0" hangingPunct="1">
+              <a:lnSpc>
+                <a:spcPct val="90000"/>
+              </a:lnSpc>
+              <a:spcBef>
+                <a:spcPts val="1000"/>
+              </a:spcBef>
+              <a:buFont typeface="Arial" panose="020B0604020202020204" pitchFamily="34" charset="0"/>
+              <a:buChar char="•"/>
+              <a:defRPr sz="2800" kern="1200">
+                <a:solidFill>
+                  <a:schemeClr val="tx1"/>
+                </a:solidFill>
+                <a:latin typeface="+mn-lt"/>
+                <a:ea typeface="+mn-ea"/>
+                <a:cs typeface="+mn-cs"/>
+              </a:defRPr>
+            </a:lvl1pPr>
+            <a:lvl2pPr marL="685800" indent="-228600" algn="l" defTabSz="914400" rtl="0" eaLnBrk="1" latinLnBrk="0" hangingPunct="1">
+              <a:lnSpc>
+                <a:spcPct val="90000"/>
+              </a:lnSpc>
+              <a:spcBef>
+                <a:spcPts val="500"/>
+              </a:spcBef>
+              <a:buFont typeface="Arial" panose="020B0604020202020204" pitchFamily="34" charset="0"/>
+              <a:buChar char="•"/>
+              <a:defRPr sz="2400" kern="1200">
+                <a:solidFill>
+                  <a:schemeClr val="tx1"/>
+                </a:solidFill>
+                <a:latin typeface="+mn-lt"/>
+                <a:ea typeface="+mn-ea"/>
+                <a:cs typeface="+mn-cs"/>
+              </a:defRPr>
+            </a:lvl2pPr>
+            <a:lvl3pPr marL="1143000" indent="-228600" algn="l" defTabSz="914400" rtl="0" eaLnBrk="1" latinLnBrk="0" hangingPunct="1">
+              <a:lnSpc>
+                <a:spcPct val="90000"/>
+              </a:lnSpc>
+              <a:spcBef>
+                <a:spcPts val="500"/>
+              </a:spcBef>
+              <a:buFont typeface="Arial" panose="020B0604020202020204" pitchFamily="34" charset="0"/>
+              <a:buChar char="•"/>
+              <a:defRPr sz="2000" kern="1200">
+                <a:solidFill>
+                  <a:schemeClr val="tx1"/>
+                </a:solidFill>
+                <a:latin typeface="+mn-lt"/>
+                <a:ea typeface="+mn-ea"/>
+                <a:cs typeface="+mn-cs"/>
+              </a:defRPr>
+            </a:lvl3pPr>
+            <a:lvl4pPr marL="1600200" indent="-228600" algn="l" defTabSz="914400" rtl="0" eaLnBrk="1" latinLnBrk="0" hangingPunct="1">
+              <a:lnSpc>
+                <a:spcPct val="90000"/>
+              </a:lnSpc>
+              <a:spcBef>
+                <a:spcPts val="500"/>
+              </a:spcBef>
+              <a:buFont typeface="Arial" panose="020B0604020202020204" pitchFamily="34" charset="0"/>
+              <a:buChar char="•"/>
+              <a:defRPr sz="1800" kern="1200">
+                <a:solidFill>
+                  <a:schemeClr val="tx1"/>
+                </a:solidFill>
+                <a:latin typeface="+mn-lt"/>
+                <a:ea typeface="+mn-ea"/>
+                <a:cs typeface="+mn-cs"/>
+              </a:defRPr>
+            </a:lvl4pPr>
+            <a:lvl5pPr marL="2057400" indent="-228600" algn="l" defTabSz="914400" rtl="0" eaLnBrk="1" latinLnBrk="0" hangingPunct="1">
+              <a:lnSpc>
+                <a:spcPct val="90000"/>
+              </a:lnSpc>
+              <a:spcBef>
+                <a:spcPts val="500"/>
+              </a:spcBef>
+              <a:buFont typeface="Arial" panose="020B0604020202020204" pitchFamily="34" charset="0"/>
+              <a:buChar char="•"/>
+              <a:defRPr sz="1800" kern="1200">
+                <a:solidFill>
+                  <a:schemeClr val="tx1"/>
+                </a:solidFill>
+                <a:latin typeface="+mn-lt"/>
+                <a:ea typeface="+mn-ea"/>
+                <a:cs typeface="+mn-cs"/>
+              </a:defRPr>
+            </a:lvl5pPr>
+            <a:lvl6pPr marL="2514600" indent="-228600" algn="l" defTabSz="914400" rtl="0" eaLnBrk="1" latinLnBrk="0" hangingPunct="1">
+              <a:lnSpc>
+                <a:spcPct val="90000"/>
+              </a:lnSpc>
+              <a:spcBef>
+                <a:spcPts val="500"/>
+              </a:spcBef>
+              <a:buFont typeface="Arial" panose="020B0604020202020204" pitchFamily="34" charset="0"/>
+              <a:buChar char="•"/>
+              <a:defRPr sz="1800" kern="1200">
+                <a:solidFill>
+                  <a:schemeClr val="tx1"/>
+                </a:solidFill>
+                <a:latin typeface="+mn-lt"/>
+                <a:ea typeface="+mn-ea"/>
+                <a:cs typeface="+mn-cs"/>
+              </a:defRPr>
+            </a:lvl6pPr>
+            <a:lvl7pPr marL="2971800" indent="-228600" algn="l" defTabSz="914400" rtl="0" eaLnBrk="1" latinLnBrk="0" hangingPunct="1">
+              <a:lnSpc>
+                <a:spcPct val="90000"/>
+              </a:lnSpc>
+              <a:spcBef>
+                <a:spcPts val="500"/>
+              </a:spcBef>
+              <a:buFont typeface="Arial" panose="020B0604020202020204" pitchFamily="34" charset="0"/>
+              <a:buChar char="•"/>
+              <a:defRPr sz="1800" kern="1200">
+                <a:solidFill>
+                  <a:schemeClr val="tx1"/>
+                </a:solidFill>
+                <a:latin typeface="+mn-lt"/>
+                <a:ea typeface="+mn-ea"/>
+                <a:cs typeface="+mn-cs"/>
+              </a:defRPr>
+            </a:lvl7pPr>
+            <a:lvl8pPr marL="3429000" indent="-228600" algn="l" defTabSz="914400" rtl="0" eaLnBrk="1" latinLnBrk="0" hangingPunct="1">
+              <a:lnSpc>
+                <a:spcPct val="90000"/>
+              </a:lnSpc>
+              <a:spcBef>
+                <a:spcPts val="500"/>
+              </a:spcBef>
+              <a:buFont typeface="Arial" panose="020B0604020202020204" pitchFamily="34" charset="0"/>
+              <a:buChar char="•"/>
+              <a:defRPr sz="1800" kern="1200">
+                <a:solidFill>
+                  <a:schemeClr val="tx1"/>
+                </a:solidFill>
+                <a:latin typeface="+mn-lt"/>
+                <a:ea typeface="+mn-ea"/>
+                <a:cs typeface="+mn-cs"/>
+              </a:defRPr>
+            </a:lvl8pPr>
+            <a:lvl9pPr marL="3886200" indent="-228600" algn="l" defTabSz="914400" rtl="0" eaLnBrk="1" latinLnBrk="0" hangingPunct="1">
+              <a:lnSpc>
+                <a:spcPct val="90000"/>
+              </a:lnSpc>
+              <a:spcBef>
+                <a:spcPts val="500"/>
+              </a:spcBef>
+              <a:buFont typeface="Arial" panose="020B0604020202020204" pitchFamily="34" charset="0"/>
+              <a:buChar char="•"/>
+              <a:defRPr sz="1800" kern="1200">
+                <a:solidFill>
+                  <a:schemeClr val="tx1"/>
+                </a:solidFill>
+                <a:latin typeface="+mn-lt"/>
+                <a:ea typeface="+mn-ea"/>
+                <a:cs typeface="+mn-cs"/>
+              </a:defRPr>
+            </a:lvl9pPr>
+          </a:lstStyle>
+          <a:p>
+            <a:pPr marL="0" indent="0">
+              <a:buFont typeface="Arial" panose="020B0604020202020204" pitchFamily="34" charset="0"/>
+              <a:buNone/>
+            </a:pPr>
+            <a:endParaRPr lang="en-US" sz="2400" dirty="0">
+              <a:solidFill>
+                <a:srgbClr val="000000"/>
+              </a:solidFill>
+            </a:endParaRPr>
+          </a:p>
+          <a:p>
+            <a:pPr>
+              <a:buClr>
+                <a:srgbClr val="FF3300"/>
+              </a:buClr>
+              <a:buFont typeface="Wingdings" panose="05000000000000000000" pitchFamily="2" charset="2"/>
+              <a:buChar char="q"/>
+            </a:pPr>
+            <a:r>
+              <a:rPr lang="en-US" sz="2400" dirty="0" smtClean="0">
+                <a:solidFill>
+                  <a:srgbClr val="000000"/>
+                </a:solidFill>
+              </a:rPr>
+              <a:t> Unexpected </a:t>
+            </a:r>
+            <a:r>
+              <a:rPr lang="en-US" sz="2400" dirty="0">
+                <a:solidFill>
+                  <a:srgbClr val="000000"/>
+                </a:solidFill>
+              </a:rPr>
+              <a:t>bugs can occur during the </a:t>
+            </a:r>
+            <a:r>
+              <a:rPr lang="en-US" sz="2400" dirty="0" smtClean="0">
+                <a:solidFill>
+                  <a:srgbClr val="000000"/>
+                </a:solidFill>
+              </a:rPr>
+              <a:t>development</a:t>
+            </a:r>
+          </a:p>
+          <a:p>
+            <a:pPr>
+              <a:buClr>
+                <a:srgbClr val="FF3300"/>
+              </a:buClr>
+              <a:buFont typeface="Wingdings" panose="05000000000000000000" pitchFamily="2" charset="2"/>
+              <a:buChar char="q"/>
+            </a:pPr>
+            <a:endParaRPr lang="en-US" sz="2400" dirty="0" smtClean="0">
+              <a:solidFill>
+                <a:srgbClr val="000000"/>
+              </a:solidFill>
+            </a:endParaRPr>
+          </a:p>
+          <a:p>
+            <a:pPr>
+              <a:buClr>
+                <a:srgbClr val="FF3300"/>
+              </a:buClr>
+              <a:buFont typeface="Wingdings" panose="05000000000000000000" pitchFamily="2" charset="2"/>
+              <a:buChar char="q"/>
+            </a:pPr>
+            <a:endParaRPr lang="en-US" sz="2400" dirty="0">
+              <a:solidFill>
+                <a:srgbClr val="000000"/>
+              </a:solidFill>
+            </a:endParaRPr>
+          </a:p>
+          <a:p>
+            <a:pPr>
+              <a:buClr>
+                <a:srgbClr val="FF3300"/>
+              </a:buClr>
+              <a:buFont typeface="Wingdings" panose="05000000000000000000" pitchFamily="2" charset="2"/>
+              <a:buChar char="q"/>
+            </a:pPr>
+            <a:r>
+              <a:rPr lang="en-US" sz="2400" dirty="0" smtClean="0">
+                <a:solidFill>
+                  <a:srgbClr val="000000"/>
+                </a:solidFill>
+              </a:rPr>
+              <a:t> Interoperability problem</a:t>
+            </a:r>
+          </a:p>
+          <a:p>
+            <a:pPr marL="457200" lvl="1" indent="0">
+              <a:buClr>
+                <a:srgbClr val="FF3300"/>
+              </a:buClr>
+              <a:buNone/>
+            </a:pPr>
+            <a:r>
+              <a:rPr lang="en-US" sz="2000" dirty="0">
+                <a:solidFill>
+                  <a:srgbClr val="000000"/>
+                </a:solidFill>
+              </a:rPr>
+              <a:t>	</a:t>
+            </a:r>
+            <a:r>
+              <a:rPr lang="en-US" sz="2000" dirty="0" smtClean="0">
+                <a:solidFill>
+                  <a:srgbClr val="000000"/>
+                </a:solidFill>
+              </a:rPr>
+              <a:t>(Grid'5000 </a:t>
+            </a:r>
+            <a:r>
+              <a:rPr lang="en-US" sz="2000" dirty="0">
+                <a:solidFill>
+                  <a:srgbClr val="000000"/>
+                </a:solidFill>
+              </a:rPr>
+              <a:t>= </a:t>
+            </a:r>
+            <a:r>
+              <a:rPr lang="en-US" sz="2000" dirty="0" err="1">
+                <a:solidFill>
+                  <a:srgbClr val="000000"/>
+                </a:solidFill>
+              </a:rPr>
+              <a:t>linux</a:t>
+            </a:r>
+            <a:r>
+              <a:rPr lang="en-US" sz="2000" dirty="0">
+                <a:solidFill>
+                  <a:srgbClr val="000000"/>
+                </a:solidFill>
+              </a:rPr>
+              <a:t>, we currently use Windows)</a:t>
+            </a:r>
+          </a:p>
+          <a:p>
+            <a:pPr marL="0" indent="0">
+              <a:buFont typeface="Arial" panose="020B0604020202020204" pitchFamily="34" charset="0"/>
+              <a:buNone/>
+            </a:pPr>
+            <a:endParaRPr lang="en-US" sz="2400" dirty="0">
+              <a:solidFill>
+                <a:srgbClr val="000000"/>
+              </a:solidFill>
+            </a:endParaRPr>
+          </a:p>
+          <a:p>
+            <a:pPr marL="0" indent="0">
+              <a:buFont typeface="Arial" panose="020B0604020202020204" pitchFamily="34" charset="0"/>
+              <a:buNone/>
+            </a:pPr>
+            <a:endParaRPr lang="en-US" sz="2400" dirty="0">
+              <a:solidFill>
+                <a:srgbClr val="000000"/>
+              </a:solidFill>
+            </a:endParaRPr>
+          </a:p>
+        </p:txBody>
+      </p:sp>
+      <p:sp>
+        <p:nvSpPr>
+          <p:cNvPr id="10" name="ZoneTexte 4"/>
+          <p:cNvSpPr txBox="1"/>
+          <p:nvPr/>
+        </p:nvSpPr>
+        <p:spPr>
+          <a:xfrm>
+            <a:off x="2505084" y="3648478"/>
+            <a:ext cx="7038975" cy="461665"/>
+          </a:xfrm>
+          <a:prstGeom prst="rect">
+            <a:avLst/>
+          </a:prstGeom>
+        </p:spPr>
+        <p:txBody>
+          <a:bodyPr rtlCol="0">
+            <a:spAutoFit/>
+          </a:bodyPr>
+          <a:lstStyle/>
+          <a:p>
+            <a:r>
+              <a:rPr lang="en-US" sz="2400" dirty="0"/>
+              <a:t>Solution : dedicate enough time to fix them.</a:t>
+            </a:r>
+            <a:endParaRPr lang="fr-FR" sz="2400" dirty="0"/>
+          </a:p>
+        </p:txBody>
+      </p:sp>
+      <p:sp>
+        <p:nvSpPr>
+          <p:cNvPr id="11" name="ZoneTexte 5"/>
+          <p:cNvSpPr txBox="1"/>
+          <p:nvPr/>
+        </p:nvSpPr>
+        <p:spPr>
+          <a:xfrm>
+            <a:off x="2505084" y="5478190"/>
+            <a:ext cx="9229725" cy="461665"/>
+          </a:xfrm>
+          <a:prstGeom prst="rect">
+            <a:avLst/>
+          </a:prstGeom>
+        </p:spPr>
+        <p:txBody>
+          <a:bodyPr rtlCol="0">
+            <a:spAutoFit/>
+          </a:bodyPr>
+          <a:lstStyle/>
+          <a:p>
+            <a:r>
+              <a:rPr lang="en-US" sz="2400" dirty="0"/>
+              <a:t>Solution : regular tests at the computer science </a:t>
+            </a:r>
+            <a:r>
+              <a:rPr lang="en-US" sz="2400" dirty="0" smtClean="0"/>
+              <a:t>department.</a:t>
+            </a:r>
+            <a:endParaRPr lang="fr-FR" sz="2400" dirty="0"/>
           </a:p>
         </p:txBody>
       </p:sp>
@@ -8797,7 +9413,7 @@
                             </p:stCondLst>
                             <p:childTnLst>
                               <p:par>
-                                <p:cTn id="5" presetID="2" presetClass="entr" presetSubtype="8" fill="hold" grpId="0" nodeType="clickEffect">
+                                <p:cTn id="5" presetID="42" presetClass="entr" presetSubtype="0" fill="hold" grpId="0" nodeType="clickEffect">
                                   <p:stCondLst>
                                     <p:cond delay="0"/>
                                   </p:stCondLst>
@@ -8820,11 +9436,361 @@
                                         <p:strVal val="visible"/>
                                       </p:to>
                                     </p:set>
+                                    <p:animEffect transition="in" filter="fade">
+                                      <p:cBhvr>
+                                        <p:cTn id="7" dur="1000"/>
+                                        <p:tgtEl>
+                                          <p:spTgt spid="4"/>
+                                        </p:tgtEl>
+                                      </p:cBhvr>
+                                    </p:animEffect>
+                                    <p:anim calcmode="lin" valueType="num">
+                                      <p:cBhvr>
+                                        <p:cTn id="8" dur="1000" fill="hold"/>
+                                        <p:tgtEl>
+                                          <p:spTgt spid="4"/>
+                                        </p:tgtEl>
+                                        <p:attrNameLst>
+                                          <p:attrName>ppt_x</p:attrName>
+                                        </p:attrNameLst>
+                                      </p:cBhvr>
+                                      <p:tavLst>
+                                        <p:tav tm="0">
+                                          <p:val>
+                                            <p:strVal val="#ppt_x"/>
+                                          </p:val>
+                                        </p:tav>
+                                        <p:tav tm="100000">
+                                          <p:val>
+                                            <p:strVal val="#ppt_x"/>
+                                          </p:val>
+                                        </p:tav>
+                                      </p:tavLst>
+                                    </p:anim>
+                                    <p:anim calcmode="lin" valueType="num">
+                                      <p:cBhvr>
+                                        <p:cTn id="9" dur="1000" fill="hold"/>
+                                        <p:tgtEl>
+                                          <p:spTgt spid="4"/>
+                                        </p:tgtEl>
+                                        <p:attrNameLst>
+                                          <p:attrName>ppt_y</p:attrName>
+                                        </p:attrNameLst>
+                                      </p:cBhvr>
+                                      <p:tavLst>
+                                        <p:tav tm="0">
+                                          <p:val>
+                                            <p:strVal val="#ppt_y+.1"/>
+                                          </p:val>
+                                        </p:tav>
+                                        <p:tav tm="100000">
+                                          <p:val>
+                                            <p:strVal val="#ppt_y"/>
+                                          </p:val>
+                                        </p:tav>
+                                      </p:tavLst>
+                                    </p:anim>
+                                  </p:childTnLst>
+                                </p:cTn>
+                              </p:par>
+                            </p:childTnLst>
+                          </p:cTn>
+                        </p:par>
+                      </p:childTnLst>
+                    </p:cTn>
+                  </p:par>
+                  <p:par>
+                    <p:cTn id="10" fill="hold">
+                      <p:stCondLst>
+                        <p:cond delay="indefinite"/>
+                      </p:stCondLst>
+                      <p:childTnLst>
+                        <p:par>
+                          <p:cTn id="11" fill="hold">
+                            <p:stCondLst>
+                              <p:cond delay="0"/>
+                            </p:stCondLst>
+                            <p:childTnLst>
+                              <p:par>
+                                <p:cTn id="12" presetID="22" presetClass="exit" presetSubtype="4" fill="hold" grpId="0" nodeType="clickEffect">
+                                  <p:stCondLst>
+                                    <p:cond delay="0"/>
+                                  </p:stCondLst>
+                                  <p:childTnLst>
+                                    <p:animEffect transition="out" filter="wipe(down)">
+                                      <p:cBhvr>
+                                        <p:cTn id="13" dur="500"/>
+                                        <p:tgtEl>
+                                          <p:spTgt spid="3">
+                                            <p:txEl>
+                                              <p:pRg st="0" end="0"/>
+                                            </p:txEl>
+                                          </p:spTgt>
+                                        </p:tgtEl>
+                                      </p:cBhvr>
+                                    </p:animEffect>
+                                    <p:set>
+                                      <p:cBhvr>
+                                        <p:cTn id="14" dur="1" fill="hold">
+                                          <p:stCondLst>
+                                            <p:cond delay="499"/>
+                                          </p:stCondLst>
+                                        </p:cTn>
+                                        <p:tgtEl>
+                                          <p:spTgt spid="3">
+                                            <p:txEl>
+                                              <p:pRg st="0" end="0"/>
+                                            </p:txEl>
+                                          </p:spTgt>
+                                        </p:tgtEl>
+                                        <p:attrNameLst>
+                                          <p:attrName>style.visibility</p:attrName>
+                                        </p:attrNameLst>
+                                      </p:cBhvr>
+                                      <p:to>
+                                        <p:strVal val="hidden"/>
+                                      </p:to>
+                                    </p:set>
+                                  </p:childTnLst>
+                                </p:cTn>
+                              </p:par>
+                              <p:par>
+                                <p:cTn id="15" presetID="22" presetClass="exit" presetSubtype="4" fill="hold" grpId="0" nodeType="withEffect">
+                                  <p:stCondLst>
+                                    <p:cond delay="0"/>
+                                  </p:stCondLst>
+                                  <p:childTnLst>
+                                    <p:animEffect transition="out" filter="wipe(down)">
+                                      <p:cBhvr>
+                                        <p:cTn id="16" dur="500"/>
+                                        <p:tgtEl>
+                                          <p:spTgt spid="3">
+                                            <p:txEl>
+                                              <p:pRg st="1" end="1"/>
+                                            </p:txEl>
+                                          </p:spTgt>
+                                        </p:tgtEl>
+                                      </p:cBhvr>
+                                    </p:animEffect>
+                                    <p:set>
+                                      <p:cBhvr>
+                                        <p:cTn id="17" dur="1" fill="hold">
+                                          <p:stCondLst>
+                                            <p:cond delay="499"/>
+                                          </p:stCondLst>
+                                        </p:cTn>
+                                        <p:tgtEl>
+                                          <p:spTgt spid="3">
+                                            <p:txEl>
+                                              <p:pRg st="1" end="1"/>
+                                            </p:txEl>
+                                          </p:spTgt>
+                                        </p:tgtEl>
+                                        <p:attrNameLst>
+                                          <p:attrName>style.visibility</p:attrName>
+                                        </p:attrNameLst>
+                                      </p:cBhvr>
+                                      <p:to>
+                                        <p:strVal val="hidden"/>
+                                      </p:to>
+                                    </p:set>
+                                  </p:childTnLst>
+                                </p:cTn>
+                              </p:par>
+                              <p:par>
+                                <p:cTn id="18" presetID="22" presetClass="exit" presetSubtype="4" fill="hold" grpId="0" nodeType="withEffect">
+                                  <p:stCondLst>
+                                    <p:cond delay="0"/>
+                                  </p:stCondLst>
+                                  <p:childTnLst>
+                                    <p:animEffect transition="out" filter="wipe(down)">
+                                      <p:cBhvr>
+                                        <p:cTn id="19" dur="500"/>
+                                        <p:tgtEl>
+                                          <p:spTgt spid="3">
+                                            <p:txEl>
+                                              <p:pRg st="2" end="2"/>
+                                            </p:txEl>
+                                          </p:spTgt>
+                                        </p:tgtEl>
+                                      </p:cBhvr>
+                                    </p:animEffect>
+                                    <p:set>
+                                      <p:cBhvr>
+                                        <p:cTn id="20" dur="1" fill="hold">
+                                          <p:stCondLst>
+                                            <p:cond delay="499"/>
+                                          </p:stCondLst>
+                                        </p:cTn>
+                                        <p:tgtEl>
+                                          <p:spTgt spid="3">
+                                            <p:txEl>
+                                              <p:pRg st="2" end="2"/>
+                                            </p:txEl>
+                                          </p:spTgt>
+                                        </p:tgtEl>
+                                        <p:attrNameLst>
+                                          <p:attrName>style.visibility</p:attrName>
+                                        </p:attrNameLst>
+                                      </p:cBhvr>
+                                      <p:to>
+                                        <p:strVal val="hidden"/>
+                                      </p:to>
+                                    </p:set>
+                                  </p:childTnLst>
+                                </p:cTn>
+                              </p:par>
+                              <p:par>
+                                <p:cTn id="21" presetID="22" presetClass="exit" presetSubtype="4" fill="hold" grpId="0" nodeType="withEffect">
+                                  <p:stCondLst>
+                                    <p:cond delay="0"/>
+                                  </p:stCondLst>
+                                  <p:childTnLst>
+                                    <p:animEffect transition="out" filter="wipe(down)">
+                                      <p:cBhvr>
+                                        <p:cTn id="22" dur="500"/>
+                                        <p:tgtEl>
+                                          <p:spTgt spid="3">
+                                            <p:txEl>
+                                              <p:pRg st="3" end="3"/>
+                                            </p:txEl>
+                                          </p:spTgt>
+                                        </p:tgtEl>
+                                      </p:cBhvr>
+                                    </p:animEffect>
+                                    <p:set>
+                                      <p:cBhvr>
+                                        <p:cTn id="23" dur="1" fill="hold">
+                                          <p:stCondLst>
+                                            <p:cond delay="499"/>
+                                          </p:stCondLst>
+                                        </p:cTn>
+                                        <p:tgtEl>
+                                          <p:spTgt spid="3">
+                                            <p:txEl>
+                                              <p:pRg st="3" end="3"/>
+                                            </p:txEl>
+                                          </p:spTgt>
+                                        </p:tgtEl>
+                                        <p:attrNameLst>
+                                          <p:attrName>style.visibility</p:attrName>
+                                        </p:attrNameLst>
+                                      </p:cBhvr>
+                                      <p:to>
+                                        <p:strVal val="hidden"/>
+                                      </p:to>
+                                    </p:set>
+                                  </p:childTnLst>
+                                </p:cTn>
+                              </p:par>
+                              <p:par>
+                                <p:cTn id="24" presetID="22" presetClass="exit" presetSubtype="4" fill="hold" grpId="1" nodeType="withEffect">
+                                  <p:stCondLst>
+                                    <p:cond delay="0"/>
+                                  </p:stCondLst>
+                                  <p:childTnLst>
+                                    <p:animEffect transition="out" filter="wipe(down)">
+                                      <p:cBhvr>
+                                        <p:cTn id="25" dur="500"/>
+                                        <p:tgtEl>
+                                          <p:spTgt spid="4"/>
+                                        </p:tgtEl>
+                                      </p:cBhvr>
+                                    </p:animEffect>
+                                    <p:set>
+                                      <p:cBhvr>
+                                        <p:cTn id="26" dur="1" fill="hold">
+                                          <p:stCondLst>
+                                            <p:cond delay="499"/>
+                                          </p:stCondLst>
+                                        </p:cTn>
+                                        <p:tgtEl>
+                                          <p:spTgt spid="4"/>
+                                        </p:tgtEl>
+                                        <p:attrNameLst>
+                                          <p:attrName>style.visibility</p:attrName>
+                                        </p:attrNameLst>
+                                      </p:cBhvr>
+                                      <p:to>
+                                        <p:strVal val="hidden"/>
+                                      </p:to>
+                                    </p:set>
+                                  </p:childTnLst>
+                                </p:cTn>
+                              </p:par>
+                              <p:par>
+                                <p:cTn id="27" presetID="42" presetClass="path" presetSubtype="0" accel="50000" decel="50000" fill="hold" nodeType="withEffect">
+                                  <p:stCondLst>
+                                    <p:cond delay="100"/>
+                                  </p:stCondLst>
+                                  <p:childTnLst>
+                                    <p:animMotion origin="layout" path="M -4.16667E-6 -3.64562E-6 L 0.00157 -0.26 " pathEditMode="relative" rAng="0" ptsTypes="AA">
+                                      <p:cBhvr>
+                                        <p:cTn id="28" dur="1000" fill="hold"/>
+                                        <p:tgtEl>
+                                          <p:spTgt spid="3">
+                                            <p:txEl>
+                                              <p:pRg st="4" end="4"/>
+                                            </p:txEl>
+                                          </p:spTgt>
+                                        </p:tgtEl>
+                                        <p:attrNameLst>
+                                          <p:attrName>ppt_x</p:attrName>
+                                          <p:attrName>ppt_y</p:attrName>
+                                        </p:attrNameLst>
+                                      </p:cBhvr>
+                                      <p:rCtr x="78" y="-13000"/>
+                                    </p:animMotion>
+                                  </p:childTnLst>
+                                </p:cTn>
+                              </p:par>
+                            </p:childTnLst>
+                          </p:cTn>
+                        </p:par>
+                      </p:childTnLst>
+                    </p:cTn>
+                  </p:par>
+                  <p:par>
+                    <p:cTn id="29" fill="hold">
+                      <p:stCondLst>
+                        <p:cond delay="indefinite"/>
+                      </p:stCondLst>
+                      <p:childTnLst>
+                        <p:par>
+                          <p:cTn id="30" fill="hold">
+                            <p:stCondLst>
+                              <p:cond delay="0"/>
+                            </p:stCondLst>
+                            <p:childTnLst>
+                              <p:par>
+                                <p:cTn id="31" presetID="2" presetClass="entr" presetSubtype="8" fill="hold" grpId="0" nodeType="clickEffect">
+                                  <p:stCondLst>
+                                    <p:cond delay="0"/>
+                                  </p:stCondLst>
+                                  <p:childTnLst>
+                                    <p:set>
+                                      <p:cBhvr>
+                                        <p:cTn id="32" dur="1" fill="hold">
+                                          <p:stCondLst>
+                                            <p:cond delay="0"/>
+                                          </p:stCondLst>
+                                        </p:cTn>
+                                        <p:tgtEl>
+                                          <p:spTgt spid="9"/>
+                                        </p:tgtEl>
+                                        <p:attrNameLst>
+                                          <p:attrName>style.visibility</p:attrName>
+                                        </p:attrNameLst>
+                                      </p:cBhvr>
+                                      <p:to>
+                                        <p:strVal val="visible"/>
+                                      </p:to>
+                                    </p:set>
                                     <p:anim calcmode="lin" valueType="num">
                                       <p:cBhvr additive="base">
-                                        <p:cTn id="7" dur="500" fill="hold"/>
+                                        <p:cTn id="33" dur="500" fill="hold"/>
                                         <p:tgtEl>
-                                          <p:spTgt spid="4"/>
+                                          <p:spTgt spid="9"/>
                                         </p:tgtEl>
                                         <p:attrNameLst>
                                           <p:attrName>ppt_x</p:attrName>
@@ -8845,9 +9811,191 @@
                                     </p:anim>
                                     <p:anim calcmode="lin" valueType="num">
                                       <p:cBhvr additive="base">
-                                        <p:cTn id="8" dur="500" fill="hold"/>
+                                        <p:cTn id="34" dur="500" fill="hold"/>
                                         <p:tgtEl>
-                                          <p:spTgt spid="4"/>
+                                          <p:spTgt spid="9"/>
+                                        </p:tgtEl>
+                                        <p:attrNameLst>
+                                          <p:attrName>ppt_y</p:attrName>
+                                        </p:attrNameLst>
+                                      </p:cBhvr>
+                                      <p:tavLst>
+                                        <p:tav tm="0">
+                                          <p:val>
+                                            <p:strVal val="#ppt_y"/>
+                                          </p:val>
+                                        </p:tav>
+                                        <p:tav tm="100000">
+                                          <p:val>
+                                            <p:strVal val="#ppt_y"/>
+                                          </p:val>
+                                        </p:tav>
+                                      </p:tavLst>
+                                    </p:anim>
+                                  </p:childTnLst>
+                                </p:cTn>
+                              </p:par>
+                            </p:childTnLst>
+                          </p:cTn>
+                        </p:par>
+                      </p:childTnLst>
+                    </p:cTn>
+                  </p:par>
+                  <p:par>
+                    <p:cTn id="35" fill="hold">
+                      <p:stCondLst>
+                        <p:cond delay="indefinite"/>
+                      </p:stCondLst>
+                      <p:childTnLst>
+                        <p:par>
+                          <p:cTn id="36" fill="hold">
+                            <p:stCondLst>
+                              <p:cond delay="0"/>
+                            </p:stCondLst>
+                            <p:childTnLst>
+                              <p:par>
+                                <p:cTn id="37" presetID="2" presetClass="entr" presetSubtype="8" fill="hold" grpId="0" nodeType="clickEffect">
+                                  <p:stCondLst>
+                                    <p:cond delay="0"/>
+                                  </p:stCondLst>
+                                  <p:childTnLst>
+                                    <p:set>
+                                      <p:cBhvr>
+                                        <p:cTn id="38" dur="1" fill="hold">
+                                          <p:stCondLst>
+                                            <p:cond delay="0"/>
+                                          </p:stCondLst>
+                                        </p:cTn>
+                                        <p:tgtEl>
+                                          <p:spTgt spid="10"/>
+                                        </p:tgtEl>
+                                        <p:attrNameLst>
+                                          <p:attrName>style.visibility</p:attrName>
+                                        </p:attrNameLst>
+                                      </p:cBhvr>
+                                      <p:to>
+                                        <p:strVal val="visible"/>
+                                      </p:to>
+                                    </p:set>
+                                    <p:anim calcmode="lin" valueType="num">
+                                      <p:cBhvr additive="base">
+                                        <p:cTn id="39" dur="500" fill="hold"/>
+                                        <p:tgtEl>
+                                          <p:spTgt spid="10"/>
+                                        </p:tgtEl>
+                                        <p:attrNameLst>
+                                          <p:attrName>ppt_x</p:attrName>
+                                        </p:attrNameLst>
+                                      </p:cBhvr>
+                                      <p:tavLst>
+                                        <p:tav tm="0">
+                                          <p:val>
+                                            <p:strVal val="0-#ppt_w/2"/>
+                                          </p:val>
+                                        </p:tav>
+                                        <p:tav tm="100000">
+                                          <p:val>
+                                            <p:strVal val="#ppt_x"/>
+                                          </p:val>
+                                        </p:tav>
+                                      </p:tavLst>
+                                    </p:anim>
+                                    <p:anim calcmode="lin" valueType="num">
+                                      <p:cBhvr additive="base">
+                                        <p:cTn id="40" dur="500" fill="hold"/>
+                                        <p:tgtEl>
+                                          <p:spTgt spid="10"/>
+                                        </p:tgtEl>
+                                        <p:attrNameLst>
+                                          <p:attrName>ppt_y</p:attrName>
+                                        </p:attrNameLst>
+                                      </p:cBhvr>
+                                      <p:tavLst>
+                                        <p:tav tm="0">
+                                          <p:val>
+                                            <p:strVal val="#ppt_y"/>
+                                          </p:val>
+                                        </p:tav>
+                                        <p:tav tm="100000">
+                                          <p:val>
+                                            <p:strVal val="#ppt_y"/>
+                                          </p:val>
+                                        </p:tav>
+                                      </p:tavLst>
+                                    </p:anim>
+                                  </p:childTnLst>
+                                </p:cTn>
+                              </p:par>
+                            </p:childTnLst>
+                          </p:cTn>
+                        </p:par>
+                      </p:childTnLst>
+                    </p:cTn>
+                  </p:par>
+                  <p:par>
+                    <p:cTn id="41" fill="hold">
+                      <p:stCondLst>
+                        <p:cond delay="indefinite"/>
+                      </p:stCondLst>
+                      <p:childTnLst>
+                        <p:par>
+                          <p:cTn id="42" fill="hold">
+                            <p:stCondLst>
+                              <p:cond delay="0"/>
+                            </p:stCondLst>
+                            <p:childTnLst>
+                              <p:par>
+                                <p:cTn id="43" presetID="2" presetClass="entr" presetSubtype="8" fill="hold" grpId="0" nodeType="clickEffect">
+                                  <p:stCondLst>
+                                    <p:cond delay="0"/>
+                                  </p:stCondLst>
+                                  <p:childTnLst>
+                                    <p:set>
+                                      <p:cBhvr>
+                                        <p:cTn id="44" dur="1" fill="hold">
+                                          <p:stCondLst>
+                                            <p:cond delay="0"/>
+                                          </p:stCondLst>
+                                        </p:cTn>
+                                        <p:tgtEl>
+                                          <p:spTgt spid="11"/>
+                                        </p:tgtEl>
+                                        <p:attrNameLst>
+                                          <p:attrName>style.visibility</p:attrName>
+                                        </p:attrNameLst>
+                                      </p:cBhvr>
+                                      <p:to>
+                                        <p:strVal val="visible"/>
+                                      </p:to>
+                                    </p:set>
+                                    <p:anim calcmode="lin" valueType="num">
+                                      <p:cBhvr additive="base">
+                                        <p:cTn id="45" dur="500" fill="hold"/>
+                                        <p:tgtEl>
+                                          <p:spTgt spid="11"/>
+                                        </p:tgtEl>
+                                        <p:attrNameLst>
+                                          <p:attrName>ppt_x</p:attrName>
+                                        </p:attrNameLst>
+                                      </p:cBhvr>
+                                      <p:tavLst>
+                                        <p:tav tm="0">
+                                          <p:val>
+                                            <p:strVal val="0-#ppt_w/2"/>
+                                          </p:val>
+                                        </p:tav>
+                                        <p:tav tm="100000">
+                                          <p:val>
+                                            <p:strVal val="#ppt_x"/>
+                                          </p:val>
+                                        </p:tav>
+                                      </p:tavLst>
+                                    </p:anim>
+                                    <p:anim calcmode="lin" valueType="num">
+                                      <p:cBhvr additive="base">
+                                        <p:cTn id="46" dur="500" fill="hold"/>
+                                        <p:tgtEl>
+                                          <p:spTgt spid="11"/>
                                         </p:tgtEl>
                                         <p:attrNameLst>
                                           <p:attrName>ppt_y</p:attrName>
@@ -8897,7 +10045,12 @@
       </p:par>
     </p:tnLst>
     <p:bldLst>
+      <p:bldP spid="3" grpId="0" uiExpand="1" build="p"/>
       <p:bldP spid="4" grpId="0"/>
+      <p:bldP spid="4" grpId="1"/>
+      <p:bldP spid="9" grpId="0"/>
+      <p:bldP spid="10" grpId="0"/>
+      <p:bldP spid="11" grpId="0"/>
     </p:bldLst>
   </p:timing>
 </p:sld>
@@ -8936,418 +10089,70 @@
           <a:lstStyle/>
           <a:p>
             <a:r>
-              <a:rPr lang="fr-FR"/>
-              <a:t>Risks analysis</a:t>
-            </a:r>
-          </a:p>
-        </p:txBody>
-      </p:sp>
-      <p:sp>
-        <p:nvSpPr>
-          <p:cNvPr id="3" name="Espace réservé du contenu 2"/>
-          <p:cNvSpPr>
-            <a:spLocks noGrp="1"/>
-          </p:cNvSpPr>
+              <a:rPr lang="fr-FR" b="1" dirty="0" smtClean="0"/>
+              <a:t>4. Important </a:t>
+            </a:r>
+            <a:r>
+              <a:rPr lang="fr-FR" b="1" dirty="0"/>
+              <a:t>dates</a:t>
+            </a:r>
+          </a:p>
+        </p:txBody>
+      </p:sp>
+      <p:pic>
+        <p:nvPicPr>
+          <p:cNvPr id="3" name="Espace réservé du contenu 2" descr="DatesChronology.png"/>
+          <p:cNvPicPr>
+            <a:picLocks noGrp="1" noChangeAspect="1"/>
+          </p:cNvPicPr>
           <p:nvPr>
             <p:ph idx="1"/>
           </p:nvPr>
-        </p:nvSpPr>
+        </p:nvPicPr>
+        <p:blipFill rotWithShape="1">
+          <a:blip r:embed="rId3">
+            <a:extLst>
+              <a:ext uri="{28A0092B-C50C-407E-A947-70E740481C1C}">
+                <a14:useLocalDpi xmlns:a14="http://schemas.microsoft.com/office/drawing/2010/main" val="0"/>
+              </a:ext>
+            </a:extLst>
+          </a:blip>
+          <a:srcRect l="5711" t="17201" r="46346" b="19708"/>
+          <a:stretch/>
+        </p:blipFill>
         <p:spPr>
           <a:xfrm>
-            <a:off x="838200" y="1825625"/>
-            <a:ext cx="3724275" cy="4351338"/>
+            <a:off x="2088000" y="1692000"/>
+            <a:ext cx="10044000" cy="1728000"/>
           </a:xfrm>
         </p:spPr>
-        <p:txBody>
-          <a:bodyPr/>
-          <a:lstStyle/>
-          <a:p>
-            <a:pPr marL="0" indent="0">
-              <a:buNone/>
-            </a:pPr>
-            <a:r>
-              <a:rPr lang="en-US" dirty="0">
-                <a:solidFill>
-                  <a:srgbClr val="000000"/>
-                </a:solidFill>
-                <a:latin typeface="Calibri"/>
-              </a:rPr>
-              <a:t>Kinds of risk:</a:t>
-            </a:r>
-          </a:p>
-          <a:p>
-            <a:pPr marL="0" indent="0">
-              <a:buNone/>
-            </a:pPr>
-            <a:r>
-              <a:rPr lang="en-US" dirty="0">
-                <a:solidFill>
-                  <a:srgbClr val="000000"/>
-                </a:solidFill>
-                <a:latin typeface="Calibri"/>
-              </a:rPr>
-              <a:t>5) Technical</a:t>
-            </a:r>
-            <a:endParaRPr lang="fr-FR" dirty="0">
-              <a:solidFill>
-                <a:srgbClr val="000000"/>
-              </a:solidFill>
-              <a:latin typeface="Calibri"/>
-            </a:endParaRPr>
-          </a:p>
-        </p:txBody>
-      </p:sp>
-      <p:sp>
-        <p:nvSpPr>
-          <p:cNvPr id="4" name="Espace réservé du contenu 2"/>
-          <p:cNvSpPr txBox="1">
-            <a:spLocks/>
-          </p:cNvSpPr>
+      </p:pic>
+      <p:pic>
+        <p:nvPicPr>
+          <p:cNvPr id="5" name="Espace réservé du contenu 2" descr="DatesChronology.png"/>
+          <p:cNvPicPr>
+            <a:picLocks noChangeAspect="1"/>
+          </p:cNvPicPr>
           <p:nvPr/>
-        </p:nvSpPr>
+        </p:nvPicPr>
+        <p:blipFill rotWithShape="1">
+          <a:blip r:embed="rId4"/>
+          <a:srcRect l="48384" r="-1321"/>
+          <a:stretch/>
+        </p:blipFill>
         <p:spPr>
           <a:xfrm>
-            <a:off x="1981200" y="2295525"/>
-            <a:ext cx="9220200" cy="4351338"/>
+            <a:off x="36000" y="3667135"/>
+            <a:ext cx="11088000" cy="2741755"/>
           </a:xfrm>
           <a:prstGeom prst="rect">
             <a:avLst/>
           </a:prstGeom>
         </p:spPr>
-        <p:txBody>
-          <a:bodyPr vert="horz" lIns="91440" tIns="45720" rIns="91440" bIns="45720" rtlCol="0">
-            <a:normAutofit/>
-          </a:bodyPr>
-          <a:lstStyle>
-            <a:lvl1pPr marL="228600" indent="-228600" algn="l" defTabSz="914400" rtl="0" eaLnBrk="1" latinLnBrk="0" hangingPunct="1">
-              <a:lnSpc>
-                <a:spcPct val="90000"/>
-              </a:lnSpc>
-              <a:spcBef>
-                <a:spcPts val="1000"/>
-              </a:spcBef>
-              <a:buFont typeface="Arial" panose="020B0604020202020204" pitchFamily="34" charset="0"/>
-              <a:buChar char="•"/>
-              <a:defRPr sz="2800" kern="1200">
-                <a:solidFill>
-                  <a:schemeClr val="tx1"/>
-                </a:solidFill>
-                <a:latin typeface="+mn-lt"/>
-                <a:ea typeface="+mn-ea"/>
-                <a:cs typeface="+mn-cs"/>
-              </a:defRPr>
-            </a:lvl1pPr>
-            <a:lvl2pPr marL="685800" indent="-228600" algn="l" defTabSz="914400" rtl="0" eaLnBrk="1" latinLnBrk="0" hangingPunct="1">
-              <a:lnSpc>
-                <a:spcPct val="90000"/>
-              </a:lnSpc>
-              <a:spcBef>
-                <a:spcPts val="500"/>
-              </a:spcBef>
-              <a:buFont typeface="Arial" panose="020B0604020202020204" pitchFamily="34" charset="0"/>
-              <a:buChar char="•"/>
-              <a:defRPr sz="2400" kern="1200">
-                <a:solidFill>
-                  <a:schemeClr val="tx1"/>
-                </a:solidFill>
-                <a:latin typeface="+mn-lt"/>
-                <a:ea typeface="+mn-ea"/>
-                <a:cs typeface="+mn-cs"/>
-              </a:defRPr>
-            </a:lvl2pPr>
-            <a:lvl3pPr marL="1143000" indent="-228600" algn="l" defTabSz="914400" rtl="0" eaLnBrk="1" latinLnBrk="0" hangingPunct="1">
-              <a:lnSpc>
-                <a:spcPct val="90000"/>
-              </a:lnSpc>
-              <a:spcBef>
-                <a:spcPts val="500"/>
-              </a:spcBef>
-              <a:buFont typeface="Arial" panose="020B0604020202020204" pitchFamily="34" charset="0"/>
-              <a:buChar char="•"/>
-              <a:defRPr sz="2000" kern="1200">
-                <a:solidFill>
-                  <a:schemeClr val="tx1"/>
-                </a:solidFill>
-                <a:latin typeface="+mn-lt"/>
-                <a:ea typeface="+mn-ea"/>
-                <a:cs typeface="+mn-cs"/>
-              </a:defRPr>
-            </a:lvl3pPr>
-            <a:lvl4pPr marL="1600200" indent="-228600" algn="l" defTabSz="914400" rtl="0" eaLnBrk="1" latinLnBrk="0" hangingPunct="1">
-              <a:lnSpc>
-                <a:spcPct val="90000"/>
-              </a:lnSpc>
-              <a:spcBef>
-                <a:spcPts val="500"/>
-              </a:spcBef>
-              <a:buFont typeface="Arial" panose="020B0604020202020204" pitchFamily="34" charset="0"/>
-              <a:buChar char="•"/>
-              <a:defRPr sz="1800" kern="1200">
-                <a:solidFill>
-                  <a:schemeClr val="tx1"/>
-                </a:solidFill>
-                <a:latin typeface="+mn-lt"/>
-                <a:ea typeface="+mn-ea"/>
-                <a:cs typeface="+mn-cs"/>
-              </a:defRPr>
-            </a:lvl4pPr>
-            <a:lvl5pPr marL="2057400" indent="-228600" algn="l" defTabSz="914400" rtl="0" eaLnBrk="1" latinLnBrk="0" hangingPunct="1">
-              <a:lnSpc>
-                <a:spcPct val="90000"/>
-              </a:lnSpc>
-              <a:spcBef>
-                <a:spcPts val="500"/>
-              </a:spcBef>
-              <a:buFont typeface="Arial" panose="020B0604020202020204" pitchFamily="34" charset="0"/>
-              <a:buChar char="•"/>
-              <a:defRPr sz="1800" kern="1200">
-                <a:solidFill>
-                  <a:schemeClr val="tx1"/>
-                </a:solidFill>
-                <a:latin typeface="+mn-lt"/>
-                <a:ea typeface="+mn-ea"/>
-                <a:cs typeface="+mn-cs"/>
-              </a:defRPr>
-            </a:lvl5pPr>
-            <a:lvl6pPr marL="2514600" indent="-228600" algn="l" defTabSz="914400" rtl="0" eaLnBrk="1" latinLnBrk="0" hangingPunct="1">
-              <a:lnSpc>
-                <a:spcPct val="90000"/>
-              </a:lnSpc>
-              <a:spcBef>
-                <a:spcPts val="500"/>
-              </a:spcBef>
-              <a:buFont typeface="Arial" panose="020B0604020202020204" pitchFamily="34" charset="0"/>
-              <a:buChar char="•"/>
-              <a:defRPr sz="1800" kern="1200">
-                <a:solidFill>
-                  <a:schemeClr val="tx1"/>
-                </a:solidFill>
-                <a:latin typeface="+mn-lt"/>
-                <a:ea typeface="+mn-ea"/>
-                <a:cs typeface="+mn-cs"/>
-              </a:defRPr>
-            </a:lvl6pPr>
-            <a:lvl7pPr marL="2971800" indent="-228600" algn="l" defTabSz="914400" rtl="0" eaLnBrk="1" latinLnBrk="0" hangingPunct="1">
-              <a:lnSpc>
-                <a:spcPct val="90000"/>
-              </a:lnSpc>
-              <a:spcBef>
-                <a:spcPts val="500"/>
-              </a:spcBef>
-              <a:buFont typeface="Arial" panose="020B0604020202020204" pitchFamily="34" charset="0"/>
-              <a:buChar char="•"/>
-              <a:defRPr sz="1800" kern="1200">
-                <a:solidFill>
-                  <a:schemeClr val="tx1"/>
-                </a:solidFill>
-                <a:latin typeface="+mn-lt"/>
-                <a:ea typeface="+mn-ea"/>
-                <a:cs typeface="+mn-cs"/>
-              </a:defRPr>
-            </a:lvl7pPr>
-            <a:lvl8pPr marL="3429000" indent="-228600" algn="l" defTabSz="914400" rtl="0" eaLnBrk="1" latinLnBrk="0" hangingPunct="1">
-              <a:lnSpc>
-                <a:spcPct val="90000"/>
-              </a:lnSpc>
-              <a:spcBef>
-                <a:spcPts val="500"/>
-              </a:spcBef>
-              <a:buFont typeface="Arial" panose="020B0604020202020204" pitchFamily="34" charset="0"/>
-              <a:buChar char="•"/>
-              <a:defRPr sz="1800" kern="1200">
-                <a:solidFill>
-                  <a:schemeClr val="tx1"/>
-                </a:solidFill>
-                <a:latin typeface="+mn-lt"/>
-                <a:ea typeface="+mn-ea"/>
-                <a:cs typeface="+mn-cs"/>
-              </a:defRPr>
-            </a:lvl8pPr>
-            <a:lvl9pPr marL="3886200" indent="-228600" algn="l" defTabSz="914400" rtl="0" eaLnBrk="1" latinLnBrk="0" hangingPunct="1">
-              <a:lnSpc>
-                <a:spcPct val="90000"/>
-              </a:lnSpc>
-              <a:spcBef>
-                <a:spcPts val="500"/>
-              </a:spcBef>
-              <a:buFont typeface="Arial" panose="020B0604020202020204" pitchFamily="34" charset="0"/>
-              <a:buChar char="•"/>
-              <a:defRPr sz="1800" kern="1200">
-                <a:solidFill>
-                  <a:schemeClr val="tx1"/>
-                </a:solidFill>
-                <a:latin typeface="+mn-lt"/>
-                <a:ea typeface="+mn-ea"/>
-                <a:cs typeface="+mn-cs"/>
-              </a:defRPr>
-            </a:lvl9pPr>
-          </a:lstStyle>
-          <a:p>
-            <a:pPr marL="0" indent="0">
-              <a:buFont typeface="Arial" panose="020B0604020202020204" pitchFamily="34" charset="0"/>
-              <a:buNone/>
-            </a:pPr>
-            <a:endParaRPr lang="en-US" sz="2400" dirty="0">
-              <a:solidFill>
-                <a:srgbClr val="000000"/>
-              </a:solidFill>
-            </a:endParaRPr>
-          </a:p>
-          <a:p>
-            <a:pPr marL="0" indent="0">
-              <a:buFont typeface="Arial" panose="020B0604020202020204" pitchFamily="34" charset="0"/>
-              <a:buNone/>
-            </a:pPr>
-            <a:r>
-              <a:rPr lang="en-US" sz="2400" dirty="0">
-                <a:solidFill>
-                  <a:srgbClr val="000000"/>
-                </a:solidFill>
-              </a:rPr>
-              <a:t>=&gt; Unexpected bugs can occur during the development</a:t>
-            </a:r>
-          </a:p>
-          <a:p>
-            <a:pPr marL="0" indent="0">
-              <a:buFont typeface="Arial" panose="020B0604020202020204" pitchFamily="34" charset="0"/>
-              <a:buNone/>
-            </a:pPr>
-            <a:endParaRPr lang="en-US" sz="2400" dirty="0">
-              <a:solidFill>
-                <a:srgbClr val="000000"/>
-              </a:solidFill>
-            </a:endParaRPr>
-          </a:p>
-          <a:p>
-            <a:pPr marL="0" indent="0">
-              <a:buFont typeface="Arial" panose="020B0604020202020204" pitchFamily="34" charset="0"/>
-              <a:buNone/>
-            </a:pPr>
-            <a:r>
-              <a:rPr lang="en-US" sz="2400" dirty="0">
-                <a:solidFill>
-                  <a:srgbClr val="000000"/>
-                </a:solidFill>
-              </a:rPr>
-              <a:t>=&gt; interoperability problems</a:t>
-            </a:r>
-            <a:br>
-              <a:rPr lang="en-US" sz="2400" dirty="0">
-                <a:solidFill>
-                  <a:srgbClr val="000000"/>
-                </a:solidFill>
-              </a:rPr>
-            </a:br>
-            <a:r>
-              <a:rPr lang="en-US" sz="2400" dirty="0">
-                <a:solidFill>
-                  <a:srgbClr val="000000"/>
-                </a:solidFill>
-              </a:rPr>
-              <a:t>       (Grid'5000 = </a:t>
-            </a:r>
-            <a:r>
-              <a:rPr lang="en-US" sz="2400" dirty="0" err="1">
-                <a:solidFill>
-                  <a:srgbClr val="000000"/>
-                </a:solidFill>
-              </a:rPr>
-              <a:t>linux</a:t>
-            </a:r>
-            <a:r>
-              <a:rPr lang="en-US" sz="2400" dirty="0">
-                <a:solidFill>
-                  <a:srgbClr val="000000"/>
-                </a:solidFill>
-              </a:rPr>
-              <a:t>, we currently use Windows)</a:t>
-            </a:r>
-          </a:p>
-          <a:p>
-            <a:pPr marL="0" indent="0">
-              <a:buFont typeface="Arial" panose="020B0604020202020204" pitchFamily="34" charset="0"/>
-              <a:buNone/>
-            </a:pPr>
-            <a:endParaRPr lang="en-US" sz="2400" dirty="0">
-              <a:solidFill>
-                <a:srgbClr val="000000"/>
-              </a:solidFill>
-            </a:endParaRPr>
-          </a:p>
-          <a:p>
-            <a:pPr marL="0" indent="0">
-              <a:buFont typeface="Arial" panose="020B0604020202020204" pitchFamily="34" charset="0"/>
-              <a:buNone/>
-            </a:pPr>
-            <a:endParaRPr lang="en-US" sz="2400" dirty="0">
-              <a:solidFill>
-                <a:srgbClr val="000000"/>
-              </a:solidFill>
-            </a:endParaRPr>
-          </a:p>
-        </p:txBody>
-      </p:sp>
-      <p:sp>
-        <p:nvSpPr>
-          <p:cNvPr id="5" name="ZoneTexte 4"/>
-          <p:cNvSpPr txBox="1"/>
-          <p:nvPr/>
-        </p:nvSpPr>
-        <p:spPr>
-          <a:xfrm>
-            <a:off x="2505085" y="3181360"/>
-            <a:ext cx="7038975" cy="461665"/>
-          </a:xfrm>
-          <a:prstGeom prst="rect">
-            <a:avLst/>
-          </a:prstGeom>
-        </p:spPr>
-        <p:txBody>
-          <a:bodyPr rtlCol="0">
-            <a:spAutoFit/>
-          </a:bodyPr>
-          <a:lstStyle/>
-          <a:p>
-            <a:r>
-              <a:rPr lang="en-US" sz="2400" dirty="0"/>
-              <a:t>Solution : dedicate enough time to fix them.</a:t>
-            </a:r>
-            <a:endParaRPr lang="fr-FR" sz="2400" dirty="0"/>
-          </a:p>
-        </p:txBody>
-      </p:sp>
-      <p:sp>
-        <p:nvSpPr>
-          <p:cNvPr id="6" name="ZoneTexte 5"/>
-          <p:cNvSpPr txBox="1"/>
-          <p:nvPr/>
-        </p:nvSpPr>
-        <p:spPr>
-          <a:xfrm>
-            <a:off x="2533660" y="4591060"/>
-            <a:ext cx="9229725" cy="461665"/>
-          </a:xfrm>
-          <a:prstGeom prst="rect">
-            <a:avLst/>
-          </a:prstGeom>
-        </p:spPr>
-        <p:txBody>
-          <a:bodyPr rtlCol="0">
-            <a:spAutoFit/>
-          </a:bodyPr>
-          <a:lstStyle/>
-          <a:p>
-            <a:r>
-              <a:rPr lang="en-US" sz="2400" dirty="0"/>
-              <a:t>Solution : regular tests at the computer science department</a:t>
-            </a:r>
-            <a:endParaRPr lang="fr-FR" sz="2400" dirty="0"/>
-          </a:p>
-        </p:txBody>
-      </p:sp>
-      <p:sp>
-        <p:nvSpPr>
-          <p:cNvPr id="7" name="Slide Number Placeholder 6"/>
+      </p:pic>
+      <p:sp>
+        <p:nvSpPr>
+          <p:cNvPr id="4" name="Slide Number Placeholder 3"/>
           <p:cNvSpPr>
             <a:spLocks noGrp="1"/>
           </p:cNvSpPr>
@@ -9371,7 +10176,7 @@
     </p:spTree>
     <p:extLst>
       <p:ext uri="{BB962C8B-B14F-4D97-AF65-F5344CB8AC3E}">
-        <p14:creationId xmlns:p14="http://schemas.microsoft.com/office/powerpoint/2010/main" val="2861530496"/>
+        <p14:creationId xmlns:p14="http://schemas.microsoft.com/office/powerpoint/2010/main" val="2704138539"/>
       </p:ext>
     </p:extLst>
   </p:cSld>
@@ -9379,315 +10184,14 @@
     <a:masterClrMapping/>
   </p:clrMapOvr>
   <p:transition spd="slow">
-    <p:push/>
+    <p:push dir="u"/>
   </p:transition>
   <p:timing>
     <p:tnLst>
       <p:par>
-        <p:cTn id="1" dur="indefinite" restart="never" nodeType="tmRoot">
-          <p:childTnLst>
-            <p:seq concurrent="1" nextAc="seek">
-              <p:cTn id="2" dur="indefinite" nodeType="mainSeq">
-                <p:childTnLst>
-                  <p:par>
-                    <p:cTn id="3" fill="hold">
-                      <p:stCondLst>
-                        <p:cond delay="indefinite"/>
-                      </p:stCondLst>
-                      <p:childTnLst>
-                        <p:par>
-                          <p:cTn id="4" fill="hold">
-                            <p:stCondLst>
-                              <p:cond delay="0"/>
-                            </p:stCondLst>
-                            <p:childTnLst>
-                              <p:par>
-                                <p:cTn id="5" presetID="2" presetClass="entr" presetSubtype="8" fill="hold" grpId="0" nodeType="clickEffect">
-                                  <p:stCondLst>
-                                    <p:cond delay="0"/>
-                                  </p:stCondLst>
-                                  <p:childTnLst>
-                                    <p:set>
-                                      <p:cBhvr>
-                                        <p:cTn id="6" dur="1" fill="hold">
-                                          <p:stCondLst>
-                                            <p:cond delay="0"/>
-                                          </p:stCondLst>
-                                        </p:cTn>
-                                        <p:tgtEl>
-                                          <p:spTgt spid="4"/>
-                                        </p:tgtEl>
-                                        <p:attrNameLst>
-                                          <p:attrName>style.visibility</p:attrName>
-                                        </p:attrNameLst>
-                                      </p:cBhvr>
-                                      <p:to>
-                                        <p:strVal val="visible"/>
-                                      </p:to>
-                                    </p:set>
-                                    <p:anim calcmode="lin" valueType="num">
-                                      <p:cBhvr additive="base">
-                                        <p:cTn id="7" dur="500" fill="hold"/>
-                                        <p:tgtEl>
-                                          <p:spTgt spid="4"/>
-                                        </p:tgtEl>
-                                        <p:attrNameLst>
-                                          <p:attrName>ppt_x</p:attrName>
-                                        </p:attrNameLst>
-                                      </p:cBhvr>
-                                      <p:tavLst>
-                                        <p:tav tm="0">
-                                          <p:val>
-                                            <p:strVal val="0-#ppt_w/2"/>
-                                          </p:val>
-                                        </p:tav>
-                                        <p:tav tm="100000">
-                                          <p:val>
-                                            <p:strVal val="#ppt_x"/>
-                                          </p:val>
-                                        </p:tav>
-                                      </p:tavLst>
-                                    </p:anim>
-                                    <p:anim calcmode="lin" valueType="num">
-                                      <p:cBhvr additive="base">
-                                        <p:cTn id="8" dur="500" fill="hold"/>
-                                        <p:tgtEl>
-                                          <p:spTgt spid="4"/>
-                                        </p:tgtEl>
-                                        <p:attrNameLst>
-                                          <p:attrName>ppt_y</p:attrName>
-                                        </p:attrNameLst>
-                                      </p:cBhvr>
-                                      <p:tavLst>
-                                        <p:tav tm="0">
-                                          <p:val>
-                                            <p:strVal val="#ppt_y"/>
-                                          </p:val>
-                                        </p:tav>
-                                        <p:tav tm="100000">
-                                          <p:val>
-                                            <p:strVal val="#ppt_y"/>
-                                          </p:val>
-                                        </p:tav>
-                                      </p:tavLst>
-                                    </p:anim>
-                                  </p:childTnLst>
-                                </p:cTn>
-                              </p:par>
-                            </p:childTnLst>
-                          </p:cTn>
-                        </p:par>
-                      </p:childTnLst>
-                    </p:cTn>
-                  </p:par>
-                  <p:par>
-                    <p:cTn id="9" fill="hold">
-                      <p:stCondLst>
-                        <p:cond delay="indefinite"/>
-                      </p:stCondLst>
-                      <p:childTnLst>
-                        <p:par>
-                          <p:cTn id="10" fill="hold">
-                            <p:stCondLst>
-                              <p:cond delay="0"/>
-                            </p:stCondLst>
-                            <p:childTnLst>
-                              <p:par>
-                                <p:cTn id="11" presetID="2" presetClass="entr" presetSubtype="8" fill="hold" grpId="0" nodeType="clickEffect">
-                                  <p:stCondLst>
-                                    <p:cond delay="0"/>
-                                  </p:stCondLst>
-                                  <p:childTnLst>
-                                    <p:set>
-                                      <p:cBhvr>
-                                        <p:cTn id="12" dur="1" fill="hold">
-                                          <p:stCondLst>
-                                            <p:cond delay="0"/>
-                                          </p:stCondLst>
-                                        </p:cTn>
-                                        <p:tgtEl>
-                                          <p:spTgt spid="5"/>
-                                        </p:tgtEl>
-                                        <p:attrNameLst>
-                                          <p:attrName>style.visibility</p:attrName>
-                                        </p:attrNameLst>
-                                      </p:cBhvr>
-                                      <p:to>
-                                        <p:strVal val="visible"/>
-                                      </p:to>
-                                    </p:set>
-                                    <p:anim calcmode="lin" valueType="num">
-                                      <p:cBhvr additive="base">
-                                        <p:cTn id="13" dur="500" fill="hold"/>
-                                        <p:tgtEl>
-                                          <p:spTgt spid="5"/>
-                                        </p:tgtEl>
-                                        <p:attrNameLst>
-                                          <p:attrName>ppt_x</p:attrName>
-                                        </p:attrNameLst>
-                                      </p:cBhvr>
-                                      <p:tavLst>
-                                        <p:tav tm="0">
-                                          <p:val>
-                                            <p:strVal val="0-#ppt_w/2"/>
-                                          </p:val>
-                                        </p:tav>
-                                        <p:tav tm="100000">
-                                          <p:val>
-                                            <p:strVal val="#ppt_x"/>
-                                          </p:val>
-                                        </p:tav>
-                                      </p:tavLst>
-                                    </p:anim>
-                                    <p:anim calcmode="lin" valueType="num">
-                                      <p:cBhvr additive="base">
-                                        <p:cTn id="14" dur="500" fill="hold"/>
-                                        <p:tgtEl>
-                                          <p:spTgt spid="5"/>
-                                        </p:tgtEl>
-                                        <p:attrNameLst>
-                                          <p:attrName>ppt_y</p:attrName>
-                                        </p:attrNameLst>
-                                      </p:cBhvr>
-                                      <p:tavLst>
-                                        <p:tav tm="0">
-                                          <p:val>
-                                            <p:strVal val="#ppt_y"/>
-                                          </p:val>
-                                        </p:tav>
-                                        <p:tav tm="100000">
-                                          <p:val>
-                                            <p:strVal val="#ppt_y"/>
-                                          </p:val>
-                                        </p:tav>
-                                      </p:tavLst>
-                                    </p:anim>
-                                  </p:childTnLst>
-                                </p:cTn>
-                              </p:par>
-                            </p:childTnLst>
-                          </p:cTn>
-                        </p:par>
-                      </p:childTnLst>
-                    </p:cTn>
-                  </p:par>
-                  <p:par>
-                    <p:cTn id="15" fill="hold">
-                      <p:stCondLst>
-                        <p:cond delay="indefinite"/>
-                      </p:stCondLst>
-                      <p:childTnLst>
-                        <p:par>
-                          <p:cTn id="16" fill="hold">
-                            <p:stCondLst>
-                              <p:cond delay="0"/>
-                            </p:stCondLst>
-                            <p:childTnLst>
-                              <p:par>
-                                <p:cTn id="17" presetID="2" presetClass="entr" presetSubtype="8" fill="hold" grpId="0" nodeType="clickEffect">
-                                  <p:stCondLst>
-                                    <p:cond delay="0"/>
-                                  </p:stCondLst>
-                                  <p:childTnLst>
-                                    <p:set>
-                                      <p:cBhvr>
-                                        <p:cTn id="18" dur="1" fill="hold">
-                                          <p:stCondLst>
-                                            <p:cond delay="0"/>
-                                          </p:stCondLst>
-                                        </p:cTn>
-                                        <p:tgtEl>
-                                          <p:spTgt spid="6"/>
-                                        </p:tgtEl>
-                                        <p:attrNameLst>
-                                          <p:attrName>style.visibility</p:attrName>
-                                        </p:attrNameLst>
-                                      </p:cBhvr>
-                                      <p:to>
-                                        <p:strVal val="visible"/>
-                                      </p:to>
-                                    </p:set>
-                                    <p:anim calcmode="lin" valueType="num">
-                                      <p:cBhvr additive="base">
-                                        <p:cTn id="19" dur="500" fill="hold"/>
-                                        <p:tgtEl>
-                                          <p:spTgt spid="6"/>
-                                        </p:tgtEl>
-                                        <p:attrNameLst>
-                                          <p:attrName>ppt_x</p:attrName>
-                                        </p:attrNameLst>
-                                      </p:cBhvr>
-                                      <p:tavLst>
-                                        <p:tav tm="0">
-                                          <p:val>
-                                            <p:strVal val="0-#ppt_w/2"/>
-                                          </p:val>
-                                        </p:tav>
-                                        <p:tav tm="100000">
-                                          <p:val>
-                                            <p:strVal val="#ppt_x"/>
-                                          </p:val>
-                                        </p:tav>
-                                      </p:tavLst>
-                                    </p:anim>
-                                    <p:anim calcmode="lin" valueType="num">
-                                      <p:cBhvr additive="base">
-                                        <p:cTn id="20" dur="500" fill="hold"/>
-                                        <p:tgtEl>
-                                          <p:spTgt spid="6"/>
-                                        </p:tgtEl>
-                                        <p:attrNameLst>
-                                          <p:attrName>ppt_y</p:attrName>
-                                        </p:attrNameLst>
-                                      </p:cBhvr>
-                                      <p:tavLst>
-                                        <p:tav tm="0">
-                                          <p:val>
-                                            <p:strVal val="#ppt_y"/>
-                                          </p:val>
-                                        </p:tav>
-                                        <p:tav tm="100000">
-                                          <p:val>
-                                            <p:strVal val="#ppt_y"/>
-                                          </p:val>
-                                        </p:tav>
-                                      </p:tavLst>
-                                    </p:anim>
-                                  </p:childTnLst>
-                                </p:cTn>
-                              </p:par>
-                            </p:childTnLst>
-                          </p:cTn>
-                        </p:par>
-                      </p:childTnLst>
-                    </p:cTn>
-                  </p:par>
-                </p:childTnLst>
-              </p:cTn>
-              <p:prevCondLst>
-                <p:cond evt="onPrev" delay="0">
-                  <p:tgtEl>
-                    <p:sldTgt/>
-                  </p:tgtEl>
-                </p:cond>
-              </p:prevCondLst>
-              <p:nextCondLst>
-                <p:cond evt="onNext" delay="0">
-                  <p:tgtEl>
-                    <p:sldTgt/>
-                  </p:tgtEl>
-                </p:cond>
-              </p:nextCondLst>
-            </p:seq>
-          </p:childTnLst>
-        </p:cTn>
+        <p:cTn id="1" dur="indefinite" restart="never" nodeType="tmRoot"/>
       </p:par>
     </p:tnLst>
-    <p:bldLst>
-      <p:bldP spid="4" grpId="0"/>
-      <p:bldP spid="5" grpId="0"/>
-      <p:bldP spid="6" grpId="0"/>
-    </p:bldLst>
   </p:timing>
 </p:sld>
 </file>
@@ -10237,7 +10741,7 @@
   <a:extraClrSchemeLst/>
   <a:extLst>
     <a:ext uri="{05A4C25C-085E-4340-85A3-A5531E510DB2}">
-      <thm15:themeFamily xmlns:thm15="http://schemas.microsoft.com/office/thememl/2012/main" xmlns="" name="Office Theme" id="{62F939B6-93AF-4DB8-9C6B-D6C7DFDC589F}" vid="{4A3C46E8-61CC-4603-A589-7422A47A8E4A}"/>
+      <thm15:themeFamily xmlns="" xmlns:thm15="http://schemas.microsoft.com/office/thememl/2012/main" name="Office Theme" id="{62F939B6-93AF-4DB8-9C6B-D6C7DFDC589F}" vid="{4A3C46E8-61CC-4603-A589-7422A47A8E4A}"/>
     </a:ext>
   </a:extLst>
 </a:theme>

</xml_diff>